<commit_message>
Lorenzo: aggiunti script gerarchia, aggiornato powerpoint, aggiunto pdf powerpoint. D3JS a seguire...
</commit_message>
<xml_diff>
--- a/PowerPoint/Treemaps.pptx
+++ b/PowerPoint/Treemaps.pptx
@@ -12,13 +12,12 @@
     <p:sldId id="261" r:id="rId6"/>
     <p:sldId id="260" r:id="rId7"/>
     <p:sldId id="262" r:id="rId8"/>
-    <p:sldId id="268" r:id="rId9"/>
-    <p:sldId id="267" r:id="rId10"/>
-    <p:sldId id="263" r:id="rId11"/>
-    <p:sldId id="264" r:id="rId12"/>
-    <p:sldId id="265" r:id="rId13"/>
-    <p:sldId id="266" r:id="rId14"/>
-    <p:sldId id="269" r:id="rId15"/>
+    <p:sldId id="267" r:id="rId9"/>
+    <p:sldId id="263" r:id="rId10"/>
+    <p:sldId id="264" r:id="rId11"/>
+    <p:sldId id="265" r:id="rId12"/>
+    <p:sldId id="266" r:id="rId13"/>
+    <p:sldId id="269" r:id="rId14"/>
   </p:sldIdLst>
   <p:sldSz cx="12192000" cy="6858000"/>
   <p:notesSz cx="6858000" cy="9144000"/>
@@ -274,7 +273,7 @@
           <a:p>
             <a:fld id="{A1720CB6-C394-4595-9B0B-B51B5CA3DAC2}" type="datetimeFigureOut">
               <a:rPr lang="it-IT" smtClean="0"/>
-              <a:t>12/05/2020</a:t>
+              <a:t>15/05/2020</a:t>
             </a:fld>
             <a:endParaRPr lang="it-IT"/>
           </a:p>
@@ -474,7 +473,7 @@
           <a:p>
             <a:fld id="{A1720CB6-C394-4595-9B0B-B51B5CA3DAC2}" type="datetimeFigureOut">
               <a:rPr lang="it-IT" smtClean="0"/>
-              <a:t>12/05/2020</a:t>
+              <a:t>15/05/2020</a:t>
             </a:fld>
             <a:endParaRPr lang="it-IT"/>
           </a:p>
@@ -684,7 +683,7 @@
           <a:p>
             <a:fld id="{A1720CB6-C394-4595-9B0B-B51B5CA3DAC2}" type="datetimeFigureOut">
               <a:rPr lang="it-IT" smtClean="0"/>
-              <a:t>12/05/2020</a:t>
+              <a:t>15/05/2020</a:t>
             </a:fld>
             <a:endParaRPr lang="it-IT"/>
           </a:p>
@@ -884,7 +883,7 @@
           <a:p>
             <a:fld id="{A1720CB6-C394-4595-9B0B-B51B5CA3DAC2}" type="datetimeFigureOut">
               <a:rPr lang="it-IT" smtClean="0"/>
-              <a:t>12/05/2020</a:t>
+              <a:t>15/05/2020</a:t>
             </a:fld>
             <a:endParaRPr lang="it-IT"/>
           </a:p>
@@ -1160,7 +1159,7 @@
           <a:p>
             <a:fld id="{A1720CB6-C394-4595-9B0B-B51B5CA3DAC2}" type="datetimeFigureOut">
               <a:rPr lang="it-IT" smtClean="0"/>
-              <a:t>12/05/2020</a:t>
+              <a:t>15/05/2020</a:t>
             </a:fld>
             <a:endParaRPr lang="it-IT"/>
           </a:p>
@@ -1428,7 +1427,7 @@
           <a:p>
             <a:fld id="{A1720CB6-C394-4595-9B0B-B51B5CA3DAC2}" type="datetimeFigureOut">
               <a:rPr lang="it-IT" smtClean="0"/>
-              <a:t>12/05/2020</a:t>
+              <a:t>15/05/2020</a:t>
             </a:fld>
             <a:endParaRPr lang="it-IT"/>
           </a:p>
@@ -1843,7 +1842,7 @@
           <a:p>
             <a:fld id="{A1720CB6-C394-4595-9B0B-B51B5CA3DAC2}" type="datetimeFigureOut">
               <a:rPr lang="it-IT" smtClean="0"/>
-              <a:t>12/05/2020</a:t>
+              <a:t>15/05/2020</a:t>
             </a:fld>
             <a:endParaRPr lang="it-IT"/>
           </a:p>
@@ -1985,7 +1984,7 @@
           <a:p>
             <a:fld id="{A1720CB6-C394-4595-9B0B-B51B5CA3DAC2}" type="datetimeFigureOut">
               <a:rPr lang="it-IT" smtClean="0"/>
-              <a:t>12/05/2020</a:t>
+              <a:t>15/05/2020</a:t>
             </a:fld>
             <a:endParaRPr lang="it-IT"/>
           </a:p>
@@ -2098,7 +2097,7 @@
           <a:p>
             <a:fld id="{A1720CB6-C394-4595-9B0B-B51B5CA3DAC2}" type="datetimeFigureOut">
               <a:rPr lang="it-IT" smtClean="0"/>
-              <a:t>12/05/2020</a:t>
+              <a:t>15/05/2020</a:t>
             </a:fld>
             <a:endParaRPr lang="it-IT"/>
           </a:p>
@@ -2411,7 +2410,7 @@
           <a:p>
             <a:fld id="{A1720CB6-C394-4595-9B0B-B51B5CA3DAC2}" type="datetimeFigureOut">
               <a:rPr lang="it-IT" smtClean="0"/>
-              <a:t>12/05/2020</a:t>
+              <a:t>15/05/2020</a:t>
             </a:fld>
             <a:endParaRPr lang="it-IT"/>
           </a:p>
@@ -2700,7 +2699,7 @@
           <a:p>
             <a:fld id="{A1720CB6-C394-4595-9B0B-B51B5CA3DAC2}" type="datetimeFigureOut">
               <a:rPr lang="it-IT" smtClean="0"/>
-              <a:t>12/05/2020</a:t>
+              <a:t>15/05/2020</a:t>
             </a:fld>
             <a:endParaRPr lang="it-IT"/>
           </a:p>
@@ -2943,7 +2942,7 @@
           <a:p>
             <a:fld id="{A1720CB6-C394-4595-9B0B-B51B5CA3DAC2}" type="datetimeFigureOut">
               <a:rPr lang="it-IT" smtClean="0"/>
-              <a:t>12/05/2020</a:t>
+              <a:t>15/05/2020</a:t>
             </a:fld>
             <a:endParaRPr lang="it-IT"/>
           </a:p>
@@ -3772,7 +3771,7 @@
           <p:cNvPr id="9" name="Picture 4">
             <a:extLst>
               <a:ext uri="{FF2B5EF4-FFF2-40B4-BE49-F238E27FC236}">
-                <a16:creationId xmlns:a16="http://schemas.microsoft.com/office/drawing/2014/main" id="{6DFFF814-6CBB-4758-88BD-E8BF3B1C38A3}"/>
+                <a16:creationId xmlns:a16="http://schemas.microsoft.com/office/drawing/2014/main" id="{86E55915-9F1D-4D4F-A3AD-6E499BF4F661}"/>
               </a:ext>
             </a:extLst>
           </p:cNvPr>
@@ -3825,10 +3824,10 @@
       </p:pic>
       <p:sp>
         <p:nvSpPr>
-          <p:cNvPr id="10" name="TextBox 9">
-            <a:extLst>
-              <a:ext uri="{FF2B5EF4-FFF2-40B4-BE49-F238E27FC236}">
-                <a16:creationId xmlns:a16="http://schemas.microsoft.com/office/drawing/2014/main" id="{CC3227F4-0F38-48EC-8AD5-5B33741E3010}"/>
+          <p:cNvPr id="5" name="TextBox 4">
+            <a:extLst>
+              <a:ext uri="{FF2B5EF4-FFF2-40B4-BE49-F238E27FC236}">
+                <a16:creationId xmlns:a16="http://schemas.microsoft.com/office/drawing/2014/main" id="{658E375D-9413-4F66-A5A7-36EAF9EAF8FC}"/>
               </a:ext>
             </a:extLst>
           </p:cNvPr>
@@ -3837,8 +3836,8 @@
         </p:nvSpPr>
         <p:spPr>
           <a:xfrm>
-            <a:off x="410333" y="1338570"/>
-            <a:ext cx="6477027" cy="369332"/>
+            <a:off x="410332" y="1338570"/>
+            <a:ext cx="5685667" cy="923330"/>
           </a:xfrm>
           <a:prstGeom prst="rect">
             <a:avLst/>
@@ -3867,17 +3866,17 @@
           <a:p>
             <a:r>
               <a:rPr lang="it-IT" dirty="0"/>
-              <a:t>Contiene l’intero dataset</a:t>
-            </a:r>
-          </a:p>
-        </p:txBody>
-      </p:sp>
-      <p:sp>
-        <p:nvSpPr>
-          <p:cNvPr id="11" name="TextBox 10">
-            <a:extLst>
-              <a:ext uri="{FF2B5EF4-FFF2-40B4-BE49-F238E27FC236}">
-                <a16:creationId xmlns:a16="http://schemas.microsoft.com/office/drawing/2014/main" id="{F684AC4B-4E1E-45AE-A274-39CFB425202E}"/>
+              <a:t>Contiene un punto del dataset comprensivo di tutti gli inquinanti, ma non della valutazione, poiché essa non è quantitativa</a:t>
+            </a:r>
+          </a:p>
+        </p:txBody>
+      </p:sp>
+      <p:sp>
+        <p:nvSpPr>
+          <p:cNvPr id="6" name="TextBox 5">
+            <a:extLst>
+              <a:ext uri="{FF2B5EF4-FFF2-40B4-BE49-F238E27FC236}">
+                <a16:creationId xmlns:a16="http://schemas.microsoft.com/office/drawing/2014/main" id="{998E6CA7-0E0E-4054-A0DE-F00F9E7C1A37}"/>
               </a:ext>
             </a:extLst>
           </p:cNvPr>
@@ -3886,57 +3885,8 @@
         </p:nvSpPr>
         <p:spPr>
           <a:xfrm>
-            <a:off x="410331" y="1707902"/>
-            <a:ext cx="6477027" cy="369332"/>
-          </a:xfrm>
-          <a:prstGeom prst="rect">
-            <a:avLst/>
-          </a:prstGeom>
-          <a:solidFill>
-            <a:schemeClr val="accent2">
-              <a:lumMod val="20000"/>
-              <a:lumOff val="80000"/>
-            </a:schemeClr>
-          </a:solidFill>
-          <a:ln w="38100">
-            <a:solidFill>
-              <a:schemeClr val="bg1"/>
-            </a:solidFill>
-          </a:ln>
-        </p:spPr>
-        <p:txBody>
-          <a:bodyPr wrap="square" rtlCol="0">
-            <a:spAutoFit/>
-          </a:bodyPr>
-          <a:lstStyle>
-            <a:defPPr>
-              <a:defRPr lang="it-IT"/>
-            </a:defPPr>
-          </a:lstStyle>
-          <a:p>
-            <a:r>
-              <a:rPr lang="it-IT" dirty="0"/>
-              <a:t>Foglie colorate per facilitare l’individuazione degli inquinanti</a:t>
-            </a:r>
-          </a:p>
-        </p:txBody>
-      </p:sp>
-      <p:sp>
-        <p:nvSpPr>
-          <p:cNvPr id="12" name="TextBox 11">
-            <a:extLst>
-              <a:ext uri="{FF2B5EF4-FFF2-40B4-BE49-F238E27FC236}">
-                <a16:creationId xmlns:a16="http://schemas.microsoft.com/office/drawing/2014/main" id="{9FB2D834-EC73-4124-90D6-3F3652694FB0}"/>
-              </a:ext>
-            </a:extLst>
-          </p:cNvPr>
-          <p:cNvSpPr txBox="1"/>
-          <p:nvPr/>
-        </p:nvSpPr>
-        <p:spPr>
-          <a:xfrm>
-            <a:off x="410329" y="2077234"/>
-            <a:ext cx="6477025" cy="369332"/>
+            <a:off x="410330" y="2631232"/>
+            <a:ext cx="5685667" cy="646331"/>
           </a:xfrm>
           <a:prstGeom prst="rect">
             <a:avLst/>
@@ -3965,17 +3915,17 @@
           <a:p>
             <a:r>
               <a:rPr lang="it-IT" dirty="0"/>
-              <a:t>Interazione: permette di esaminare qualunque punto del dataset</a:t>
-            </a:r>
-          </a:p>
-        </p:txBody>
-      </p:sp>
-      <p:sp>
-        <p:nvSpPr>
-          <p:cNvPr id="13" name="TextBox 12">
-            <a:extLst>
-              <a:ext uri="{FF2B5EF4-FFF2-40B4-BE49-F238E27FC236}">
-                <a16:creationId xmlns:a16="http://schemas.microsoft.com/office/drawing/2014/main" id="{1134B998-5544-4055-A17F-C87817F22F5B}"/>
+              <a:t>Scopo: Confrontare le proporzioni di inquinanti in un punto della gerarchia </a:t>
+            </a:r>
+          </a:p>
+        </p:txBody>
+      </p:sp>
+      <p:sp>
+        <p:nvSpPr>
+          <p:cNvPr id="7" name="TextBox 6">
+            <a:extLst>
+              <a:ext uri="{FF2B5EF4-FFF2-40B4-BE49-F238E27FC236}">
+                <a16:creationId xmlns:a16="http://schemas.microsoft.com/office/drawing/2014/main" id="{B8C56A01-0BFB-492A-9DD7-A955539323EC}"/>
               </a:ext>
             </a:extLst>
           </p:cNvPr>
@@ -3984,8 +3934,8 @@
         </p:nvSpPr>
         <p:spPr>
           <a:xfrm>
-            <a:off x="410323" y="2446566"/>
-            <a:ext cx="6477025" cy="369332"/>
+            <a:off x="410331" y="2261900"/>
+            <a:ext cx="5685666" cy="369332"/>
           </a:xfrm>
           <a:prstGeom prst="rect">
             <a:avLst/>
@@ -4014,17 +3964,17 @@
           <a:p>
             <a:r>
               <a:rPr lang="it-IT" dirty="0"/>
-              <a:t>Scopo: esplorazione del dataset</a:t>
-            </a:r>
-          </a:p>
-        </p:txBody>
-      </p:sp>
-      <p:sp>
-        <p:nvSpPr>
-          <p:cNvPr id="15" name="TextBox 14">
-            <a:extLst>
-              <a:ext uri="{FF2B5EF4-FFF2-40B4-BE49-F238E27FC236}">
-                <a16:creationId xmlns:a16="http://schemas.microsoft.com/office/drawing/2014/main" id="{BEC5CCBE-059B-4E3C-B9E3-7DA343ED030C}"/>
+              <a:t>Scarsa percezione dei trend</a:t>
+            </a:r>
+          </a:p>
+        </p:txBody>
+      </p:sp>
+      <p:sp>
+        <p:nvSpPr>
+          <p:cNvPr id="10" name="TextBox 9">
+            <a:extLst>
+              <a:ext uri="{FF2B5EF4-FFF2-40B4-BE49-F238E27FC236}">
+                <a16:creationId xmlns:a16="http://schemas.microsoft.com/office/drawing/2014/main" id="{63144AC6-0827-4833-9E34-52B2C3D35147}"/>
               </a:ext>
             </a:extLst>
           </p:cNvPr>
@@ -4034,7 +3984,7 @@
         <p:spPr>
           <a:xfrm>
             <a:off x="0" y="0"/>
-            <a:ext cx="6887361" cy="830997"/>
+            <a:ext cx="6096000" cy="830997"/>
           </a:xfrm>
           <a:prstGeom prst="rect">
             <a:avLst/>
@@ -4060,17 +4010,17 @@
           <a:p>
             <a:r>
               <a:rPr lang="it-IT" dirty="0"/>
-              <a:t>ALBERO ESPLORABILE</a:t>
-            </a:r>
-          </a:p>
-        </p:txBody>
-      </p:sp>
-      <p:sp>
-        <p:nvSpPr>
-          <p:cNvPr id="17" name="Rectangle 16">
-            <a:extLst>
-              <a:ext uri="{FF2B5EF4-FFF2-40B4-BE49-F238E27FC236}">
-                <a16:creationId xmlns:a16="http://schemas.microsoft.com/office/drawing/2014/main" id="{6B3AF0A0-0EEE-4CC7-A0E7-9C3E5B287E84}"/>
+              <a:t>TREEMAP</a:t>
+            </a:r>
+          </a:p>
+        </p:txBody>
+      </p:sp>
+      <p:sp>
+        <p:nvSpPr>
+          <p:cNvPr id="12" name="Rectangle 11">
+            <a:extLst>
+              <a:ext uri="{FF2B5EF4-FFF2-40B4-BE49-F238E27FC236}">
+                <a16:creationId xmlns:a16="http://schemas.microsoft.com/office/drawing/2014/main" id="{27FDB874-6647-4DB2-8C12-4EEC606469F6}"/>
               </a:ext>
             </a:extLst>
           </p:cNvPr>
@@ -4079,8 +4029,8 @@
         </p:nvSpPr>
         <p:spPr>
           <a:xfrm>
-            <a:off x="6887360" y="0"/>
-            <a:ext cx="5304639" cy="6858000"/>
+            <a:off x="6096000" y="1"/>
+            <a:ext cx="6096000" cy="6858000"/>
           </a:xfrm>
           <a:prstGeom prst="rect">
             <a:avLst/>
@@ -4127,7 +4077,7 @@
           <p:cNvPr id="3" name="Picture 2">
             <a:extLst>
               <a:ext uri="{FF2B5EF4-FFF2-40B4-BE49-F238E27FC236}">
-                <a16:creationId xmlns:a16="http://schemas.microsoft.com/office/drawing/2014/main" id="{BDED0F34-72AA-408E-AFF1-6EE3BB6566E5}"/>
+                <a16:creationId xmlns:a16="http://schemas.microsoft.com/office/drawing/2014/main" id="{297E0059-26E5-4FCC-A88F-0B226DC8F79D}"/>
               </a:ext>
             </a:extLst>
           </p:cNvPr>
@@ -4144,8 +4094,8 @@
         </p:blipFill>
         <p:spPr>
           <a:xfrm>
-            <a:off x="7036600" y="1189048"/>
-            <a:ext cx="5006157" cy="4479903"/>
+            <a:off x="6279642" y="561315"/>
+            <a:ext cx="5728716" cy="5735370"/>
           </a:xfrm>
           <a:prstGeom prst="rect">
             <a:avLst/>
@@ -4154,10 +4104,10 @@
       </p:pic>
       <p:cxnSp>
         <p:nvCxnSpPr>
-          <p:cNvPr id="18" name="Straight Connector 17">
-            <a:extLst>
-              <a:ext uri="{FF2B5EF4-FFF2-40B4-BE49-F238E27FC236}">
-                <a16:creationId xmlns:a16="http://schemas.microsoft.com/office/drawing/2014/main" id="{2792D1B7-317F-40E8-A6D7-E96FDA55B498}"/>
+          <p:cNvPr id="13" name="Straight Connector 12">
+            <a:extLst>
+              <a:ext uri="{FF2B5EF4-FFF2-40B4-BE49-F238E27FC236}">
+                <a16:creationId xmlns:a16="http://schemas.microsoft.com/office/drawing/2014/main" id="{CD7C0679-B669-4722-ACA5-95D37323171A}"/>
               </a:ext>
             </a:extLst>
           </p:cNvPr>
@@ -4169,7 +4119,7 @@
         <p:spPr>
           <a:xfrm>
             <a:off x="847288" y="789052"/>
-            <a:ext cx="6040060" cy="0"/>
+            <a:ext cx="5248709" cy="0"/>
           </a:xfrm>
           <a:prstGeom prst="line">
             <a:avLst/>
@@ -4199,11 +4149,56 @@
       </p:cxnSp>
       <p:sp>
         <p:nvSpPr>
-          <p:cNvPr id="5" name="Action Button: Return 4">
+          <p:cNvPr id="16" name="Action Button: Get Information 15">
+            <a:hlinkClick r:id="" action="ppaction://noaction" highlightClick="1"/>
+            <a:extLst>
+              <a:ext uri="{FF2B5EF4-FFF2-40B4-BE49-F238E27FC236}">
+                <a16:creationId xmlns:a16="http://schemas.microsoft.com/office/drawing/2014/main" id="{F63641C1-3994-42B6-BA14-E810CD3F8FD9}"/>
+              </a:ext>
+            </a:extLst>
+          </p:cNvPr>
+          <p:cNvSpPr/>
+          <p:nvPr/>
+        </p:nvSpPr>
+        <p:spPr>
+          <a:xfrm>
+            <a:off x="11453336" y="6484362"/>
+            <a:ext cx="369330" cy="369332"/>
+          </a:xfrm>
+          <a:prstGeom prst="actionButtonInformation">
+            <a:avLst/>
+          </a:prstGeom>
+        </p:spPr>
+        <p:style>
+          <a:lnRef idx="1">
+            <a:schemeClr val="accent4"/>
+          </a:lnRef>
+          <a:fillRef idx="2">
+            <a:schemeClr val="accent4"/>
+          </a:fillRef>
+          <a:effectRef idx="1">
+            <a:schemeClr val="accent4"/>
+          </a:effectRef>
+          <a:fontRef idx="minor">
+            <a:schemeClr val="dk1"/>
+          </a:fontRef>
+        </p:style>
+        <p:txBody>
+          <a:bodyPr rtlCol="0" anchor="ctr"/>
+          <a:lstStyle/>
+          <a:p>
+            <a:pPr algn="ctr"/>
+            <a:endParaRPr lang="it-IT" dirty="0"/>
+          </a:p>
+        </p:txBody>
+      </p:sp>
+      <p:sp>
+        <p:nvSpPr>
+          <p:cNvPr id="15" name="Action Button: Return 14">
             <a:hlinkClick r:id="rId5" highlightClick="1"/>
             <a:extLst>
               <a:ext uri="{FF2B5EF4-FFF2-40B4-BE49-F238E27FC236}">
-                <a16:creationId xmlns:a16="http://schemas.microsoft.com/office/drawing/2014/main" id="{0371A25A-8B2E-4D6E-83DE-21A091903F5F}"/>
+                <a16:creationId xmlns:a16="http://schemas.microsoft.com/office/drawing/2014/main" id="{AB6FF239-833B-47BB-BCBF-411B6CAD2CCE}"/>
               </a:ext>
             </a:extLst>
           </p:cNvPr>
@@ -4242,16 +4237,329 @@
           </a:p>
         </p:txBody>
       </p:sp>
+      <p:sp>
+        <p:nvSpPr>
+          <p:cNvPr id="17" name="TextBox 16">
+            <a:extLst>
+              <a:ext uri="{FF2B5EF4-FFF2-40B4-BE49-F238E27FC236}">
+                <a16:creationId xmlns:a16="http://schemas.microsoft.com/office/drawing/2014/main" id="{BC12292F-0B02-49C1-8719-29DF5A775336}"/>
+              </a:ext>
+            </a:extLst>
+          </p:cNvPr>
+          <p:cNvSpPr txBox="1"/>
+          <p:nvPr/>
+        </p:nvSpPr>
+        <p:spPr>
+          <a:xfrm>
+            <a:off x="410327" y="3277563"/>
+            <a:ext cx="5685667" cy="369332"/>
+          </a:xfrm>
+          <a:prstGeom prst="rect">
+            <a:avLst/>
+          </a:prstGeom>
+          <a:solidFill>
+            <a:schemeClr val="accent2">
+              <a:lumMod val="20000"/>
+              <a:lumOff val="80000"/>
+            </a:schemeClr>
+          </a:solidFill>
+          <a:ln w="38100">
+            <a:solidFill>
+              <a:schemeClr val="bg1"/>
+            </a:solidFill>
+          </a:ln>
+        </p:spPr>
+        <p:txBody>
+          <a:bodyPr wrap="square" rtlCol="0">
+            <a:spAutoFit/>
+          </a:bodyPr>
+          <a:lstStyle>
+            <a:defPPr>
+              <a:defRPr lang="it-IT"/>
+            </a:defPPr>
+          </a:lstStyle>
+          <a:p>
+            <a:r>
+              <a:rPr lang="it-IT" dirty="0"/>
+              <a:t>Problema: eccessiva preponderanza del CO</a:t>
+            </a:r>
+          </a:p>
+        </p:txBody>
+      </p:sp>
+      <p:pic>
+        <p:nvPicPr>
+          <p:cNvPr id="11" name="Picture 10">
+            <a:extLst>
+              <a:ext uri="{FF2B5EF4-FFF2-40B4-BE49-F238E27FC236}">
+                <a16:creationId xmlns:a16="http://schemas.microsoft.com/office/drawing/2014/main" id="{98435150-EB42-4112-8536-C4C34F611070}"/>
+              </a:ext>
+            </a:extLst>
+          </p:cNvPr>
+          <p:cNvPicPr>
+            <a:picLocks noChangeAspect="1"/>
+          </p:cNvPicPr>
+          <p:nvPr/>
+        </p:nvPicPr>
+        <p:blipFill>
+          <a:blip r:embed="rId6"/>
+          <a:stretch>
+            <a:fillRect/>
+          </a:stretch>
+        </p:blipFill>
+        <p:spPr>
+          <a:xfrm>
+            <a:off x="2933400" y="273794"/>
+            <a:ext cx="6325190" cy="6310411"/>
+          </a:xfrm>
+          <a:prstGeom prst="rect">
+            <a:avLst/>
+          </a:prstGeom>
+          <a:ln w="76200">
+            <a:solidFill>
+              <a:srgbClr val="7030A0"/>
+            </a:solidFill>
+          </a:ln>
+          <a:effectLst>
+            <a:outerShdw blurRad="50800" dist="38100" dir="2700000" algn="tl" rotWithShape="0">
+              <a:prstClr val="black">
+                <a:alpha val="40000"/>
+              </a:prstClr>
+            </a:outerShdw>
+          </a:effectLst>
+          <a:scene3d>
+            <a:camera prst="orthographicFront"/>
+            <a:lightRig rig="threePt" dir="t"/>
+          </a:scene3d>
+          <a:sp3d>
+            <a:bevelT prst="relaxedInset"/>
+          </a:sp3d>
+        </p:spPr>
+      </p:pic>
     </p:spTree>
     <p:extLst>
       <p:ext uri="{BB962C8B-B14F-4D97-AF65-F5344CB8AC3E}">
-        <p14:creationId xmlns:p14="http://schemas.microsoft.com/office/powerpoint/2010/main" val="2413595051"/>
+        <p14:creationId xmlns:p14="http://schemas.microsoft.com/office/powerpoint/2010/main" val="993709750"/>
       </p:ext>
     </p:extLst>
   </p:cSld>
   <p:clrMapOvr>
     <a:masterClrMapping/>
   </p:clrMapOvr>
+  <p:timing>
+    <p:tnLst>
+      <p:par>
+        <p:cTn id="1" dur="indefinite" restart="never" nodeType="tmRoot">
+          <p:childTnLst>
+            <p:seq concurrent="1" nextAc="seek">
+              <p:cTn id="2" restart="whenNotActive" fill="hold" evtFilter="cancelBubble" nodeType="interactiveSeq">
+                <p:stCondLst>
+                  <p:cond evt="onClick" delay="0">
+                    <p:tgtEl>
+                      <p:spTgt spid="16"/>
+                    </p:tgtEl>
+                  </p:cond>
+                </p:stCondLst>
+                <p:endSync evt="end" delay="0">
+                  <p:rtn val="all"/>
+                </p:endSync>
+                <p:childTnLst>
+                  <p:par>
+                    <p:cTn id="3" fill="hold">
+                      <p:stCondLst>
+                        <p:cond delay="0"/>
+                      </p:stCondLst>
+                      <p:childTnLst>
+                        <p:par>
+                          <p:cTn id="4" fill="hold">
+                            <p:stCondLst>
+                              <p:cond delay="0"/>
+                            </p:stCondLst>
+                            <p:childTnLst>
+                              <p:par>
+                                <p:cTn id="5" presetID="2" presetClass="entr" presetSubtype="8" fill="hold" nodeType="clickEffect">
+                                  <p:stCondLst>
+                                    <p:cond delay="0"/>
+                                  </p:stCondLst>
+                                  <p:childTnLst>
+                                    <p:set>
+                                      <p:cBhvr>
+                                        <p:cTn id="6" dur="1" fill="hold">
+                                          <p:stCondLst>
+                                            <p:cond delay="0"/>
+                                          </p:stCondLst>
+                                        </p:cTn>
+                                        <p:tgtEl>
+                                          <p:spTgt spid="11"/>
+                                        </p:tgtEl>
+                                        <p:attrNameLst>
+                                          <p:attrName>style.visibility</p:attrName>
+                                        </p:attrNameLst>
+                                      </p:cBhvr>
+                                      <p:to>
+                                        <p:strVal val="visible"/>
+                                      </p:to>
+                                    </p:set>
+                                    <p:anim calcmode="lin" valueType="num">
+                                      <p:cBhvr additive="base">
+                                        <p:cTn id="7" dur="500" fill="hold"/>
+                                        <p:tgtEl>
+                                          <p:spTgt spid="11"/>
+                                        </p:tgtEl>
+                                        <p:attrNameLst>
+                                          <p:attrName>ppt_x</p:attrName>
+                                        </p:attrNameLst>
+                                      </p:cBhvr>
+                                      <p:tavLst>
+                                        <p:tav tm="0">
+                                          <p:val>
+                                            <p:strVal val="0-#ppt_w/2"/>
+                                          </p:val>
+                                        </p:tav>
+                                        <p:tav tm="100000">
+                                          <p:val>
+                                            <p:strVal val="#ppt_x"/>
+                                          </p:val>
+                                        </p:tav>
+                                      </p:tavLst>
+                                    </p:anim>
+                                    <p:anim calcmode="lin" valueType="num">
+                                      <p:cBhvr additive="base">
+                                        <p:cTn id="8" dur="500" fill="hold"/>
+                                        <p:tgtEl>
+                                          <p:spTgt spid="11"/>
+                                        </p:tgtEl>
+                                        <p:attrNameLst>
+                                          <p:attrName>ppt_y</p:attrName>
+                                        </p:attrNameLst>
+                                      </p:cBhvr>
+                                      <p:tavLst>
+                                        <p:tav tm="0">
+                                          <p:val>
+                                            <p:strVal val="#ppt_y"/>
+                                          </p:val>
+                                        </p:tav>
+                                        <p:tav tm="100000">
+                                          <p:val>
+                                            <p:strVal val="#ppt_y"/>
+                                          </p:val>
+                                        </p:tav>
+                                      </p:tavLst>
+                                    </p:anim>
+                                  </p:childTnLst>
+                                </p:cTn>
+                              </p:par>
+                            </p:childTnLst>
+                          </p:cTn>
+                        </p:par>
+                      </p:childTnLst>
+                    </p:cTn>
+                  </p:par>
+                  <p:par>
+                    <p:cTn id="9" fill="hold">
+                      <p:stCondLst>
+                        <p:cond delay="indefinite"/>
+                      </p:stCondLst>
+                      <p:childTnLst>
+                        <p:par>
+                          <p:cTn id="10" fill="hold">
+                            <p:stCondLst>
+                              <p:cond delay="0"/>
+                            </p:stCondLst>
+                            <p:childTnLst>
+                              <p:par>
+                                <p:cTn id="11" presetID="2" presetClass="exit" presetSubtype="2" fill="hold" nodeType="clickEffect">
+                                  <p:stCondLst>
+                                    <p:cond delay="0"/>
+                                  </p:stCondLst>
+                                  <p:childTnLst>
+                                    <p:anim calcmode="lin" valueType="num">
+                                      <p:cBhvr additive="base">
+                                        <p:cTn id="12" dur="500"/>
+                                        <p:tgtEl>
+                                          <p:spTgt spid="11"/>
+                                        </p:tgtEl>
+                                        <p:attrNameLst>
+                                          <p:attrName>ppt_x</p:attrName>
+                                        </p:attrNameLst>
+                                      </p:cBhvr>
+                                      <p:tavLst>
+                                        <p:tav tm="0">
+                                          <p:val>
+                                            <p:strVal val="ppt_x"/>
+                                          </p:val>
+                                        </p:tav>
+                                        <p:tav tm="100000">
+                                          <p:val>
+                                            <p:strVal val="1+ppt_w/2"/>
+                                          </p:val>
+                                        </p:tav>
+                                      </p:tavLst>
+                                    </p:anim>
+                                    <p:anim calcmode="lin" valueType="num">
+                                      <p:cBhvr additive="base">
+                                        <p:cTn id="13" dur="500"/>
+                                        <p:tgtEl>
+                                          <p:spTgt spid="11"/>
+                                        </p:tgtEl>
+                                        <p:attrNameLst>
+                                          <p:attrName>ppt_y</p:attrName>
+                                        </p:attrNameLst>
+                                      </p:cBhvr>
+                                      <p:tavLst>
+                                        <p:tav tm="0">
+                                          <p:val>
+                                            <p:strVal val="ppt_y"/>
+                                          </p:val>
+                                        </p:tav>
+                                        <p:tav tm="100000">
+                                          <p:val>
+                                            <p:strVal val="ppt_y"/>
+                                          </p:val>
+                                        </p:tav>
+                                      </p:tavLst>
+                                    </p:anim>
+                                    <p:set>
+                                      <p:cBhvr>
+                                        <p:cTn id="14" dur="1" fill="hold">
+                                          <p:stCondLst>
+                                            <p:cond delay="499"/>
+                                          </p:stCondLst>
+                                        </p:cTn>
+                                        <p:tgtEl>
+                                          <p:spTgt spid="11"/>
+                                        </p:tgtEl>
+                                        <p:attrNameLst>
+                                          <p:attrName>style.visibility</p:attrName>
+                                        </p:attrNameLst>
+                                      </p:cBhvr>
+                                      <p:to>
+                                        <p:strVal val="hidden"/>
+                                      </p:to>
+                                    </p:set>
+                                  </p:childTnLst>
+                                </p:cTn>
+                              </p:par>
+                            </p:childTnLst>
+                          </p:cTn>
+                        </p:par>
+                      </p:childTnLst>
+                    </p:cTn>
+                  </p:par>
+                </p:childTnLst>
+              </p:cTn>
+              <p:nextCondLst>
+                <p:cond evt="onClick" delay="0">
+                  <p:tgtEl>
+                    <p:spTgt spid="16"/>
+                  </p:tgtEl>
+                </p:cond>
+              </p:nextCondLst>
+            </p:seq>
+          </p:childTnLst>
+        </p:cTn>
+      </p:par>
+    </p:tnLst>
+  </p:timing>
 </p:sld>
 </file>
 
@@ -4274,10 +4582,10 @@
       </p:grpSpPr>
       <p:pic>
         <p:nvPicPr>
-          <p:cNvPr id="9" name="Picture 4">
-            <a:extLst>
-              <a:ext uri="{FF2B5EF4-FFF2-40B4-BE49-F238E27FC236}">
-                <a16:creationId xmlns:a16="http://schemas.microsoft.com/office/drawing/2014/main" id="{86E55915-9F1D-4D4F-A3AD-6E499BF4F661}"/>
+          <p:cNvPr id="15" name="Picture 4">
+            <a:extLst>
+              <a:ext uri="{FF2B5EF4-FFF2-40B4-BE49-F238E27FC236}">
+                <a16:creationId xmlns:a16="http://schemas.microsoft.com/office/drawing/2014/main" id="{EB02F5E3-4B7B-4AD7-A8CA-A9EEFBA0880D}"/>
               </a:ext>
             </a:extLst>
           </p:cNvPr>
@@ -4330,10 +4638,10 @@
       </p:pic>
       <p:sp>
         <p:nvSpPr>
-          <p:cNvPr id="5" name="TextBox 4">
-            <a:extLst>
-              <a:ext uri="{FF2B5EF4-FFF2-40B4-BE49-F238E27FC236}">
-                <a16:creationId xmlns:a16="http://schemas.microsoft.com/office/drawing/2014/main" id="{658E375D-9413-4F66-A5A7-36EAF9EAF8FC}"/>
+          <p:cNvPr id="8" name="TextBox 7">
+            <a:extLst>
+              <a:ext uri="{FF2B5EF4-FFF2-40B4-BE49-F238E27FC236}">
+                <a16:creationId xmlns:a16="http://schemas.microsoft.com/office/drawing/2014/main" id="{AE99EB09-7BBC-4A92-9446-141F787123C9}"/>
               </a:ext>
             </a:extLst>
           </p:cNvPr>
@@ -4342,8 +4650,58 @@
         </p:nvSpPr>
         <p:spPr>
           <a:xfrm>
-            <a:off x="410332" y="1338570"/>
-            <a:ext cx="5685667" cy="923330"/>
+            <a:off x="2769502" y="1236841"/>
+            <a:ext cx="6652994" cy="369332"/>
+          </a:xfrm>
+          <a:prstGeom prst="rect">
+            <a:avLst/>
+          </a:prstGeom>
+          <a:solidFill>
+            <a:schemeClr val="accent5">
+              <a:lumMod val="20000"/>
+              <a:lumOff val="80000"/>
+            </a:schemeClr>
+          </a:solidFill>
+          <a:ln w="38100">
+            <a:solidFill>
+              <a:schemeClr val="bg1"/>
+            </a:solidFill>
+          </a:ln>
+        </p:spPr>
+        <p:txBody>
+          <a:bodyPr wrap="square" rtlCol="0">
+            <a:spAutoFit/>
+          </a:bodyPr>
+          <a:lstStyle>
+            <a:defPPr>
+              <a:defRPr lang="it-IT"/>
+            </a:defPPr>
+          </a:lstStyle>
+          <a:p>
+            <a:pPr algn="ctr"/>
+            <a:r>
+              <a:rPr lang="it-IT" dirty="0"/>
+              <a:t>Contiene una porzione del dataset: la gerarchia e un inquinante</a:t>
+            </a:r>
+          </a:p>
+        </p:txBody>
+      </p:sp>
+      <p:sp>
+        <p:nvSpPr>
+          <p:cNvPr id="11" name="TextBox 10">
+            <a:extLst>
+              <a:ext uri="{FF2B5EF4-FFF2-40B4-BE49-F238E27FC236}">
+                <a16:creationId xmlns:a16="http://schemas.microsoft.com/office/drawing/2014/main" id="{DA5164D2-3798-4F27-8C79-EC72DD667C83}"/>
+              </a:ext>
+            </a:extLst>
+          </p:cNvPr>
+          <p:cNvSpPr txBox="1"/>
+          <p:nvPr/>
+        </p:nvSpPr>
+        <p:spPr>
+          <a:xfrm>
+            <a:off x="2769502" y="1982253"/>
+            <a:ext cx="6652994" cy="369332"/>
           </a:xfrm>
           <a:prstGeom prst="rect">
             <a:avLst/>
@@ -4370,19 +4728,20 @@
             </a:defPPr>
           </a:lstStyle>
           <a:p>
+            <a:pPr algn="ctr"/>
             <a:r>
               <a:rPr lang="it-IT" dirty="0"/>
-              <a:t>Contiene un giorno del dataset comprensivo di tutti gli inquinanti, ma non della valutazione, poiché essa non è quantitativa</a:t>
-            </a:r>
-          </a:p>
-        </p:txBody>
-      </p:sp>
-      <p:sp>
-        <p:nvSpPr>
-          <p:cNvPr id="6" name="TextBox 5">
-            <a:extLst>
-              <a:ext uri="{FF2B5EF4-FFF2-40B4-BE49-F238E27FC236}">
-                <a16:creationId xmlns:a16="http://schemas.microsoft.com/office/drawing/2014/main" id="{998E6CA7-0E0E-4054-A0DE-F00F9E7C1A37}"/>
+              <a:t>Interazione: drill-down in una porzione della gerarchia</a:t>
+            </a:r>
+          </a:p>
+        </p:txBody>
+      </p:sp>
+      <p:sp>
+        <p:nvSpPr>
+          <p:cNvPr id="12" name="TextBox 11">
+            <a:extLst>
+              <a:ext uri="{FF2B5EF4-FFF2-40B4-BE49-F238E27FC236}">
+                <a16:creationId xmlns:a16="http://schemas.microsoft.com/office/drawing/2014/main" id="{517C0950-CA54-445B-9AA5-BDE88D1FF4AE}"/>
               </a:ext>
             </a:extLst>
           </p:cNvPr>
@@ -4391,57 +4750,8 @@
         </p:nvSpPr>
         <p:spPr>
           <a:xfrm>
-            <a:off x="410330" y="2631232"/>
-            <a:ext cx="5685667" cy="646331"/>
-          </a:xfrm>
-          <a:prstGeom prst="rect">
-            <a:avLst/>
-          </a:prstGeom>
-          <a:solidFill>
-            <a:schemeClr val="accent5">
-              <a:lumMod val="20000"/>
-              <a:lumOff val="80000"/>
-            </a:schemeClr>
-          </a:solidFill>
-          <a:ln w="38100">
-            <a:solidFill>
-              <a:schemeClr val="bg1"/>
-            </a:solidFill>
-          </a:ln>
-        </p:spPr>
-        <p:txBody>
-          <a:bodyPr wrap="square" rtlCol="0">
-            <a:spAutoFit/>
-          </a:bodyPr>
-          <a:lstStyle>
-            <a:defPPr>
-              <a:defRPr lang="it-IT"/>
-            </a:defPPr>
-          </a:lstStyle>
-          <a:p>
-            <a:r>
-              <a:rPr lang="it-IT" dirty="0"/>
-              <a:t>Scopo: Confrontare le proporzioni di inquinanti in un punto della gerarchia </a:t>
-            </a:r>
-          </a:p>
-        </p:txBody>
-      </p:sp>
-      <p:sp>
-        <p:nvSpPr>
-          <p:cNvPr id="7" name="TextBox 6">
-            <a:extLst>
-              <a:ext uri="{FF2B5EF4-FFF2-40B4-BE49-F238E27FC236}">
-                <a16:creationId xmlns:a16="http://schemas.microsoft.com/office/drawing/2014/main" id="{B8C56A01-0BFB-492A-9DD7-A955539323EC}"/>
-              </a:ext>
-            </a:extLst>
-          </p:cNvPr>
-          <p:cNvSpPr txBox="1"/>
-          <p:nvPr/>
-        </p:nvSpPr>
-        <p:spPr>
-          <a:xfrm>
-            <a:off x="410331" y="2261900"/>
-            <a:ext cx="5685666" cy="369332"/>
+            <a:off x="2769502" y="1609547"/>
+            <a:ext cx="6652994" cy="369332"/>
           </a:xfrm>
           <a:prstGeom prst="rect">
             <a:avLst/>
@@ -4468,19 +4778,20 @@
             </a:defPPr>
           </a:lstStyle>
           <a:p>
+            <a:pPr algn="ctr"/>
             <a:r>
               <a:rPr lang="it-IT" dirty="0"/>
-              <a:t>Scarsa percezione dei trend</a:t>
-            </a:r>
-          </a:p>
-        </p:txBody>
-      </p:sp>
-      <p:sp>
-        <p:nvSpPr>
-          <p:cNvPr id="10" name="TextBox 9">
-            <a:extLst>
-              <a:ext uri="{FF2B5EF4-FFF2-40B4-BE49-F238E27FC236}">
-                <a16:creationId xmlns:a16="http://schemas.microsoft.com/office/drawing/2014/main" id="{63144AC6-0827-4833-9E34-52B2C3D35147}"/>
+              <a:t>Parte della gerarchia è innestata a destra</a:t>
+            </a:r>
+          </a:p>
+        </p:txBody>
+      </p:sp>
+      <p:sp>
+        <p:nvSpPr>
+          <p:cNvPr id="13" name="TextBox 12">
+            <a:extLst>
+              <a:ext uri="{FF2B5EF4-FFF2-40B4-BE49-F238E27FC236}">
+                <a16:creationId xmlns:a16="http://schemas.microsoft.com/office/drawing/2014/main" id="{657FC0E2-1414-4A6C-B714-9EFA38E72EC1}"/>
               </a:ext>
             </a:extLst>
           </p:cNvPr>
@@ -4489,8 +4800,58 @@
         </p:nvSpPr>
         <p:spPr>
           <a:xfrm>
+            <a:off x="2769502" y="2351715"/>
+            <a:ext cx="6652994" cy="369332"/>
+          </a:xfrm>
+          <a:prstGeom prst="rect">
+            <a:avLst/>
+          </a:prstGeom>
+          <a:solidFill>
+            <a:schemeClr val="accent2">
+              <a:lumMod val="20000"/>
+              <a:lumOff val="80000"/>
+            </a:schemeClr>
+          </a:solidFill>
+          <a:ln w="38100">
+            <a:solidFill>
+              <a:schemeClr val="bg1"/>
+            </a:solidFill>
+          </a:ln>
+        </p:spPr>
+        <p:txBody>
+          <a:bodyPr wrap="square" rtlCol="0">
+            <a:spAutoFit/>
+          </a:bodyPr>
+          <a:lstStyle>
+            <a:defPPr>
+              <a:defRPr lang="it-IT"/>
+            </a:defPPr>
+          </a:lstStyle>
+          <a:p>
+            <a:pPr algn="ctr"/>
+            <a:r>
+              <a:rPr lang="it-IT" dirty="0"/>
+              <a:t>Scopo: visualizzazione dei trend relativamente alla gerarchia</a:t>
+            </a:r>
+          </a:p>
+        </p:txBody>
+      </p:sp>
+      <p:sp>
+        <p:nvSpPr>
+          <p:cNvPr id="16" name="TextBox 15">
+            <a:extLst>
+              <a:ext uri="{FF2B5EF4-FFF2-40B4-BE49-F238E27FC236}">
+                <a16:creationId xmlns:a16="http://schemas.microsoft.com/office/drawing/2014/main" id="{8AB2F7A1-9E40-4EC8-8B25-5E2A8B15963D}"/>
+              </a:ext>
+            </a:extLst>
+          </p:cNvPr>
+          <p:cNvSpPr txBox="1"/>
+          <p:nvPr/>
+        </p:nvSpPr>
+        <p:spPr>
+          <a:xfrm>
             <a:off x="0" y="0"/>
-            <a:ext cx="6096000" cy="830997"/>
+            <a:ext cx="12192000" cy="830997"/>
           </a:xfrm>
           <a:prstGeom prst="rect">
             <a:avLst/>
@@ -4516,17 +4877,17 @@
           <a:p>
             <a:r>
               <a:rPr lang="it-IT" dirty="0"/>
-              <a:t>TREEMAP</a:t>
-            </a:r>
-          </a:p>
-        </p:txBody>
-      </p:sp>
-      <p:sp>
-        <p:nvSpPr>
-          <p:cNvPr id="12" name="Rectangle 11">
-            <a:extLst>
-              <a:ext uri="{FF2B5EF4-FFF2-40B4-BE49-F238E27FC236}">
-                <a16:creationId xmlns:a16="http://schemas.microsoft.com/office/drawing/2014/main" id="{27FDB874-6647-4DB2-8C12-4EEC606469F6}"/>
+              <a:t>ICICLE GRAPH</a:t>
+            </a:r>
+          </a:p>
+        </p:txBody>
+      </p:sp>
+      <p:sp>
+        <p:nvSpPr>
+          <p:cNvPr id="17" name="Rectangle 16">
+            <a:extLst>
+              <a:ext uri="{FF2B5EF4-FFF2-40B4-BE49-F238E27FC236}">
+                <a16:creationId xmlns:a16="http://schemas.microsoft.com/office/drawing/2014/main" id="{182246A2-A21B-4714-AB79-0C8735AFF2FD}"/>
               </a:ext>
             </a:extLst>
           </p:cNvPr>
@@ -4535,14 +4896,14 @@
         </p:nvSpPr>
         <p:spPr>
           <a:xfrm>
-            <a:off x="6096000" y="1"/>
-            <a:ext cx="6096000" cy="6858000"/>
+            <a:off x="0" y="2721307"/>
+            <a:ext cx="6095999" cy="4140067"/>
           </a:xfrm>
           <a:prstGeom prst="rect">
             <a:avLst/>
           </a:prstGeom>
           <a:solidFill>
-            <a:schemeClr val="accent3">
+            <a:schemeClr val="tx2">
               <a:lumMod val="20000"/>
               <a:lumOff val="80000"/>
             </a:schemeClr>
@@ -4578,12 +4939,119 @@
           </a:p>
         </p:txBody>
       </p:sp>
+      <p:sp>
+        <p:nvSpPr>
+          <p:cNvPr id="6" name="TextBox 5">
+            <a:extLst>
+              <a:ext uri="{FF2B5EF4-FFF2-40B4-BE49-F238E27FC236}">
+                <a16:creationId xmlns:a16="http://schemas.microsoft.com/office/drawing/2014/main" id="{DE835881-8C61-48DD-8F8D-AC3348995363}"/>
+              </a:ext>
+            </a:extLst>
+          </p:cNvPr>
+          <p:cNvSpPr txBox="1"/>
+          <p:nvPr/>
+        </p:nvSpPr>
+        <p:spPr>
+          <a:xfrm>
+            <a:off x="0" y="2721307"/>
+            <a:ext cx="1254981" cy="369332"/>
+          </a:xfrm>
+          <a:prstGeom prst="rect">
+            <a:avLst/>
+          </a:prstGeom>
+          <a:solidFill>
+            <a:schemeClr val="tx2">
+              <a:lumMod val="20000"/>
+              <a:lumOff val="80000"/>
+            </a:schemeClr>
+          </a:solidFill>
+          <a:ln w="38100">
+            <a:solidFill>
+              <a:schemeClr val="bg1"/>
+            </a:solidFill>
+          </a:ln>
+        </p:spPr>
+        <p:txBody>
+          <a:bodyPr wrap="square" rtlCol="0">
+            <a:spAutoFit/>
+          </a:bodyPr>
+          <a:lstStyle>
+            <a:defPPr>
+              <a:defRPr lang="it-IT"/>
+            </a:defPPr>
+          </a:lstStyle>
+          <a:p>
+            <a:pPr algn="r"/>
+            <a:r>
+              <a:rPr lang="it-IT" dirty="0"/>
+              <a:t>PM10</a:t>
+            </a:r>
+          </a:p>
+        </p:txBody>
+      </p:sp>
+      <p:sp>
+        <p:nvSpPr>
+          <p:cNvPr id="18" name="Rectangle 17">
+            <a:extLst>
+              <a:ext uri="{FF2B5EF4-FFF2-40B4-BE49-F238E27FC236}">
+                <a16:creationId xmlns:a16="http://schemas.microsoft.com/office/drawing/2014/main" id="{453A263E-A374-42DC-BF8E-F0E94A0DA1E7}"/>
+              </a:ext>
+            </a:extLst>
+          </p:cNvPr>
+          <p:cNvSpPr/>
+          <p:nvPr/>
+        </p:nvSpPr>
+        <p:spPr>
+          <a:xfrm>
+            <a:off x="6095999" y="2721307"/>
+            <a:ext cx="6079686" cy="4140067"/>
+          </a:xfrm>
+          <a:prstGeom prst="rect">
+            <a:avLst/>
+          </a:prstGeom>
+          <a:solidFill>
+            <a:schemeClr val="tx2">
+              <a:lumMod val="20000"/>
+              <a:lumOff val="80000"/>
+            </a:schemeClr>
+          </a:solidFill>
+          <a:ln w="38100">
+            <a:solidFill>
+              <a:schemeClr val="bg1"/>
+            </a:solidFill>
+          </a:ln>
+        </p:spPr>
+        <p:style>
+          <a:lnRef idx="2">
+            <a:schemeClr val="accent1">
+              <a:shade val="50000"/>
+            </a:schemeClr>
+          </a:lnRef>
+          <a:fillRef idx="1">
+            <a:schemeClr val="accent1"/>
+          </a:fillRef>
+          <a:effectRef idx="0">
+            <a:schemeClr val="accent1"/>
+          </a:effectRef>
+          <a:fontRef idx="minor">
+            <a:schemeClr val="lt1"/>
+          </a:fontRef>
+        </p:style>
+        <p:txBody>
+          <a:bodyPr rtlCol="0" anchor="ctr"/>
+          <a:lstStyle/>
+          <a:p>
+            <a:pPr algn="ctr"/>
+            <a:endParaRPr lang="it-IT" dirty="0"/>
+          </a:p>
+        </p:txBody>
+      </p:sp>
       <p:pic>
         <p:nvPicPr>
-          <p:cNvPr id="3" name="Picture 2">
-            <a:extLst>
-              <a:ext uri="{FF2B5EF4-FFF2-40B4-BE49-F238E27FC236}">
-                <a16:creationId xmlns:a16="http://schemas.microsoft.com/office/drawing/2014/main" id="{297E0059-26E5-4FCC-A88F-0B226DC8F79D}"/>
+          <p:cNvPr id="2" name="Picture 1">
+            <a:extLst>
+              <a:ext uri="{FF2B5EF4-FFF2-40B4-BE49-F238E27FC236}">
+                <a16:creationId xmlns:a16="http://schemas.microsoft.com/office/drawing/2014/main" id="{480729BF-E37D-4EE8-BB3F-495DE9A36872}"/>
               </a:ext>
             </a:extLst>
           </p:cNvPr>
@@ -4600,20 +5068,99 @@
         </p:blipFill>
         <p:spPr>
           <a:xfrm>
-            <a:off x="6279642" y="561315"/>
-            <a:ext cx="5728716" cy="5735370"/>
+            <a:off x="6129556" y="2926887"/>
+            <a:ext cx="4783223" cy="3728906"/>
           </a:xfrm>
           <a:prstGeom prst="rect">
             <a:avLst/>
           </a:prstGeom>
         </p:spPr>
       </p:pic>
+      <p:pic>
+        <p:nvPicPr>
+          <p:cNvPr id="4" name="Picture 3">
+            <a:extLst>
+              <a:ext uri="{FF2B5EF4-FFF2-40B4-BE49-F238E27FC236}">
+                <a16:creationId xmlns:a16="http://schemas.microsoft.com/office/drawing/2014/main" id="{F18E2021-5705-489C-B8B2-12D9AF3C54A7}"/>
+              </a:ext>
+            </a:extLst>
+          </p:cNvPr>
+          <p:cNvPicPr>
+            <a:picLocks noChangeAspect="1"/>
+          </p:cNvPicPr>
+          <p:nvPr/>
+        </p:nvPicPr>
+        <p:blipFill>
+          <a:blip r:embed="rId5"/>
+          <a:stretch>
+            <a:fillRect/>
+          </a:stretch>
+        </p:blipFill>
+        <p:spPr>
+          <a:xfrm>
+            <a:off x="1271296" y="2926887"/>
+            <a:ext cx="4799537" cy="3728906"/>
+          </a:xfrm>
+          <a:prstGeom prst="rect">
+            <a:avLst/>
+          </a:prstGeom>
+        </p:spPr>
+      </p:pic>
+      <p:sp>
+        <p:nvSpPr>
+          <p:cNvPr id="7" name="TextBox 6">
+            <a:extLst>
+              <a:ext uri="{FF2B5EF4-FFF2-40B4-BE49-F238E27FC236}">
+                <a16:creationId xmlns:a16="http://schemas.microsoft.com/office/drawing/2014/main" id="{7B0B4645-DA16-40F5-AC99-2BF507B43A29}"/>
+              </a:ext>
+            </a:extLst>
+          </p:cNvPr>
+          <p:cNvSpPr txBox="1"/>
+          <p:nvPr/>
+        </p:nvSpPr>
+        <p:spPr>
+          <a:xfrm>
+            <a:off x="10929093" y="2721307"/>
+            <a:ext cx="1262906" cy="369332"/>
+          </a:xfrm>
+          <a:prstGeom prst="rect">
+            <a:avLst/>
+          </a:prstGeom>
+          <a:solidFill>
+            <a:schemeClr val="tx2">
+              <a:lumMod val="20000"/>
+              <a:lumOff val="80000"/>
+            </a:schemeClr>
+          </a:solidFill>
+          <a:ln w="38100">
+            <a:solidFill>
+              <a:schemeClr val="bg1"/>
+            </a:solidFill>
+          </a:ln>
+        </p:spPr>
+        <p:txBody>
+          <a:bodyPr wrap="square" rtlCol="0">
+            <a:spAutoFit/>
+          </a:bodyPr>
+          <a:lstStyle>
+            <a:defPPr>
+              <a:defRPr lang="it-IT"/>
+            </a:defPPr>
+          </a:lstStyle>
+          <a:p>
+            <a:r>
+              <a:rPr lang="it-IT" dirty="0"/>
+              <a:t>Ozono</a:t>
+            </a:r>
+          </a:p>
+        </p:txBody>
+      </p:sp>
       <p:cxnSp>
         <p:nvCxnSpPr>
-          <p:cNvPr id="13" name="Straight Connector 12">
-            <a:extLst>
-              <a:ext uri="{FF2B5EF4-FFF2-40B4-BE49-F238E27FC236}">
-                <a16:creationId xmlns:a16="http://schemas.microsoft.com/office/drawing/2014/main" id="{CD7C0679-B669-4722-ACA5-95D37323171A}"/>
+          <p:cNvPr id="21" name="Straight Connector 20">
+            <a:extLst>
+              <a:ext uri="{FF2B5EF4-FFF2-40B4-BE49-F238E27FC236}">
+                <a16:creationId xmlns:a16="http://schemas.microsoft.com/office/drawing/2014/main" id="{DDE4F5A0-51C3-40E5-9150-ABE96C64BCE8}"/>
               </a:ext>
             </a:extLst>
           </p:cNvPr>
@@ -4624,8 +5171,8 @@
         </p:nvCxnSpPr>
         <p:spPr>
           <a:xfrm>
-            <a:off x="847288" y="789052"/>
-            <a:ext cx="5248709" cy="0"/>
+            <a:off x="1580099" y="789052"/>
+            <a:ext cx="9023755" cy="0"/>
           </a:xfrm>
           <a:prstGeom prst="line">
             <a:avLst/>
@@ -4655,11 +5202,11 @@
       </p:cxnSp>
       <p:sp>
         <p:nvSpPr>
-          <p:cNvPr id="15" name="Action Button: Return 14">
-            <a:hlinkClick r:id="rId5" highlightClick="1"/>
-            <a:extLst>
-              <a:ext uri="{FF2B5EF4-FFF2-40B4-BE49-F238E27FC236}">
-                <a16:creationId xmlns:a16="http://schemas.microsoft.com/office/drawing/2014/main" id="{AB6FF239-833B-47BB-BCBF-411B6CAD2CCE}"/>
+          <p:cNvPr id="22" name="Action Button: Return 21">
+            <a:hlinkClick r:id="rId6" highlightClick="1"/>
+            <a:extLst>
+              <a:ext uri="{FF2B5EF4-FFF2-40B4-BE49-F238E27FC236}">
+                <a16:creationId xmlns:a16="http://schemas.microsoft.com/office/drawing/2014/main" id="{C408AFD2-D4FF-46EA-9B3B-3BAAAC7C7DFC}"/>
               </a:ext>
             </a:extLst>
           </p:cNvPr>
@@ -4698,10 +5245,55 @@
           </a:p>
         </p:txBody>
       </p:sp>
+      <p:sp>
+        <p:nvSpPr>
+          <p:cNvPr id="23" name="Action Button: Return 22">
+            <a:hlinkClick r:id="rId7" highlightClick="1"/>
+            <a:extLst>
+              <a:ext uri="{FF2B5EF4-FFF2-40B4-BE49-F238E27FC236}">
+                <a16:creationId xmlns:a16="http://schemas.microsoft.com/office/drawing/2014/main" id="{78AA24FB-41CD-4745-9872-BC5E9402CF12}"/>
+              </a:ext>
+            </a:extLst>
+          </p:cNvPr>
+          <p:cNvSpPr/>
+          <p:nvPr/>
+        </p:nvSpPr>
+        <p:spPr>
+          <a:xfrm rot="5400000">
+            <a:off x="-1" y="6488668"/>
+            <a:ext cx="369332" cy="369332"/>
+          </a:xfrm>
+          <a:prstGeom prst="actionButtonReturn">
+            <a:avLst/>
+          </a:prstGeom>
+        </p:spPr>
+        <p:style>
+          <a:lnRef idx="1">
+            <a:schemeClr val="accent2"/>
+          </a:lnRef>
+          <a:fillRef idx="2">
+            <a:schemeClr val="accent2"/>
+          </a:fillRef>
+          <a:effectRef idx="1">
+            <a:schemeClr val="accent2"/>
+          </a:effectRef>
+          <a:fontRef idx="minor">
+            <a:schemeClr val="dk1"/>
+          </a:fontRef>
+        </p:style>
+        <p:txBody>
+          <a:bodyPr rtlCol="0" anchor="ctr"/>
+          <a:lstStyle/>
+          <a:p>
+            <a:pPr algn="ctr"/>
+            <a:endParaRPr lang="it-IT"/>
+          </a:p>
+        </p:txBody>
+      </p:sp>
     </p:spTree>
     <p:extLst>
       <p:ext uri="{BB962C8B-B14F-4D97-AF65-F5344CB8AC3E}">
-        <p14:creationId xmlns:p14="http://schemas.microsoft.com/office/powerpoint/2010/main" val="993709750"/>
+        <p14:creationId xmlns:p14="http://schemas.microsoft.com/office/powerpoint/2010/main" val="849370008"/>
       </p:ext>
     </p:extLst>
   </p:cSld>
@@ -4730,10 +5322,10 @@
       </p:grpSpPr>
       <p:pic>
         <p:nvPicPr>
-          <p:cNvPr id="15" name="Picture 4">
-            <a:extLst>
-              <a:ext uri="{FF2B5EF4-FFF2-40B4-BE49-F238E27FC236}">
-                <a16:creationId xmlns:a16="http://schemas.microsoft.com/office/drawing/2014/main" id="{EB02F5E3-4B7B-4AD7-A8CA-A9EEFBA0880D}"/>
+          <p:cNvPr id="9" name="Picture 4">
+            <a:extLst>
+              <a:ext uri="{FF2B5EF4-FFF2-40B4-BE49-F238E27FC236}">
+                <a16:creationId xmlns:a16="http://schemas.microsoft.com/office/drawing/2014/main" id="{DF4E3FBD-CFD3-46EA-973D-463B7FD85E60}"/>
               </a:ext>
             </a:extLst>
           </p:cNvPr>
@@ -4744,8 +5336,7 @@
         </p:nvPicPr>
         <p:blipFill rotWithShape="1">
           <a:blip r:embed="rId2">
-            <a:lum bright="70000" contrast="-70000"/>
-            <a:alphaModFix amt="20000"/>
+            <a:alphaModFix/>
             <a:extLst>
               <a:ext uri="{BEBA8EAE-BF5A-486C-A8C5-ECC9F3942E4B}">
                 <a14:imgProps xmlns:a14="http://schemas.microsoft.com/office/drawing/2010/main">
@@ -4786,28 +5377,27 @@
       </p:pic>
       <p:sp>
         <p:nvSpPr>
-          <p:cNvPr id="8" name="TextBox 7">
-            <a:extLst>
-              <a:ext uri="{FF2B5EF4-FFF2-40B4-BE49-F238E27FC236}">
-                <a16:creationId xmlns:a16="http://schemas.microsoft.com/office/drawing/2014/main" id="{AE99EB09-7BBC-4A92-9446-141F787123C9}"/>
-              </a:ext>
-            </a:extLst>
-          </p:cNvPr>
-          <p:cNvSpPr txBox="1"/>
-          <p:nvPr/>
-        </p:nvSpPr>
-        <p:spPr>
-          <a:xfrm>
-            <a:off x="2769502" y="1236841"/>
-            <a:ext cx="6652994" cy="369332"/>
+          <p:cNvPr id="2" name="Rectangle 1">
+            <a:extLst>
+              <a:ext uri="{FF2B5EF4-FFF2-40B4-BE49-F238E27FC236}">
+                <a16:creationId xmlns:a16="http://schemas.microsoft.com/office/drawing/2014/main" id="{3D34911B-1C94-4C55-82FB-3DB0FBC0F3DC}"/>
+              </a:ext>
+            </a:extLst>
+          </p:cNvPr>
+          <p:cNvSpPr/>
+          <p:nvPr/>
+        </p:nvSpPr>
+        <p:spPr>
+          <a:xfrm>
+            <a:off x="2094833" y="1089898"/>
+            <a:ext cx="8002335" cy="2339102"/>
           </a:xfrm>
           <a:prstGeom prst="rect">
             <a:avLst/>
           </a:prstGeom>
           <a:solidFill>
-            <a:schemeClr val="accent5">
-              <a:lumMod val="20000"/>
-              <a:lumOff val="80000"/>
+            <a:schemeClr val="bg1">
+              <a:lumMod val="95000"/>
             </a:schemeClr>
           </a:solidFill>
           <a:ln w="38100">
@@ -4820,26 +5410,213 @@
           <a:bodyPr wrap="square" rtlCol="0">
             <a:spAutoFit/>
           </a:bodyPr>
-          <a:lstStyle>
-            <a:defPPr>
-              <a:defRPr lang="it-IT"/>
-            </a:defPPr>
-          </a:lstStyle>
-          <a:p>
-            <a:pPr algn="ctr"/>
-            <a:r>
-              <a:rPr lang="it-IT" dirty="0"/>
-              <a:t>Contiene una porzione del dataset: la gerarchia e un inquinante</a:t>
-            </a:r>
-          </a:p>
-        </p:txBody>
-      </p:sp>
-      <p:sp>
-        <p:nvSpPr>
-          <p:cNvPr id="11" name="TextBox 10">
-            <a:extLst>
-              <a:ext uri="{FF2B5EF4-FFF2-40B4-BE49-F238E27FC236}">
-                <a16:creationId xmlns:a16="http://schemas.microsoft.com/office/drawing/2014/main" id="{DA5164D2-3798-4F27-8C79-EC72DD667C83}"/>
+          <a:lstStyle/>
+          <a:p>
+            <a:pPr marL="285750" indent="-285750">
+              <a:buFont typeface="Wingdings" panose="05000000000000000000" pitchFamily="2" charset="2"/>
+              <a:buChar char="v"/>
+            </a:pPr>
+            <a:r>
+              <a:rPr lang="it-IT" sz="1600" dirty="0">
+                <a:latin typeface="+mj-lt"/>
+                <a:hlinkClick r:id="rId4">
+                  <a:extLst>
+                    <a:ext uri="{A12FA001-AC4F-418D-AE19-62706E023703}">
+                      <ahyp:hlinkClr xmlns:ahyp="http://schemas.microsoft.com/office/drawing/2018/hyperlinkcolor" val="tx"/>
+                    </a:ext>
+                  </a:extLst>
+                </a:hlinkClick>
+              </a:rPr>
+              <a:t>https://observablehq.com/@d3/tidy-tree</a:t>
+            </a:r>
+            <a:endParaRPr lang="it-IT" sz="1600" dirty="0">
+              <a:latin typeface="+mj-lt"/>
+            </a:endParaRPr>
+          </a:p>
+          <a:p>
+            <a:pPr marL="285750" indent="-285750">
+              <a:buFont typeface="Wingdings" panose="05000000000000000000" pitchFamily="2" charset="2"/>
+              <a:buChar char="v"/>
+            </a:pPr>
+            <a:r>
+              <a:rPr lang="it-IT" sz="1600" dirty="0">
+                <a:latin typeface="+mj-lt"/>
+                <a:hlinkClick r:id="rId5">
+                  <a:extLst>
+                    <a:ext uri="{A12FA001-AC4F-418D-AE19-62706E023703}">
+                      <ahyp:hlinkClr xmlns:ahyp="http://schemas.microsoft.com/office/drawing/2018/hyperlinkcolor" val="tx"/>
+                    </a:ext>
+                  </a:extLst>
+                </a:hlinkClick>
+              </a:rPr>
+              <a:t>https://observablehq.com/@d3/treemap</a:t>
+            </a:r>
+            <a:endParaRPr lang="it-IT" sz="1600" dirty="0">
+              <a:latin typeface="+mj-lt"/>
+            </a:endParaRPr>
+          </a:p>
+          <a:p>
+            <a:pPr marL="285750" indent="-285750">
+              <a:buFont typeface="Wingdings" panose="05000000000000000000" pitchFamily="2" charset="2"/>
+              <a:buChar char="v"/>
+            </a:pPr>
+            <a:r>
+              <a:rPr lang="it-IT" sz="1600" dirty="0">
+                <a:latin typeface="+mj-lt"/>
+                <a:hlinkClick r:id="rId6">
+                  <a:extLst>
+                    <a:ext uri="{A12FA001-AC4F-418D-AE19-62706E023703}">
+                      <ahyp:hlinkClr xmlns:ahyp="http://schemas.microsoft.com/office/drawing/2018/hyperlinkcolor" val="tx"/>
+                    </a:ext>
+                  </a:extLst>
+                </a:hlinkClick>
+              </a:rPr>
+              <a:t>https://www.cs.umd.edu/hcil/treemap-history</a:t>
+            </a:r>
+            <a:endParaRPr lang="it-IT" sz="1600" dirty="0">
+              <a:latin typeface="+mj-lt"/>
+            </a:endParaRPr>
+          </a:p>
+          <a:p>
+            <a:pPr marL="285750" indent="-285750">
+              <a:buFont typeface="Wingdings" panose="05000000000000000000" pitchFamily="2" charset="2"/>
+              <a:buChar char="v"/>
+            </a:pPr>
+            <a:r>
+              <a:rPr lang="it-IT" sz="1600" dirty="0">
+                <a:latin typeface="+mj-lt"/>
+                <a:hlinkClick r:id="rId7">
+                  <a:extLst>
+                    <a:ext uri="{A12FA001-AC4F-418D-AE19-62706E023703}">
+                      <ahyp:hlinkClr xmlns:ahyp="http://schemas.microsoft.com/office/drawing/2018/hyperlinkcolor" val="tx"/>
+                    </a:ext>
+                  </a:extLst>
+                </a:hlinkClick>
+              </a:rPr>
+              <a:t>https://newsmap-js.herokuapp.com</a:t>
+            </a:r>
+            <a:endParaRPr lang="it-IT" sz="1600" dirty="0">
+              <a:latin typeface="+mj-lt"/>
+            </a:endParaRPr>
+          </a:p>
+          <a:p>
+            <a:pPr marL="285750" indent="-285750">
+              <a:buFont typeface="Wingdings" panose="05000000000000000000" pitchFamily="2" charset="2"/>
+              <a:buChar char="v"/>
+            </a:pPr>
+            <a:r>
+              <a:rPr lang="it-IT" sz="1600" dirty="0">
+                <a:latin typeface="+mj-lt"/>
+                <a:hlinkClick r:id="rId8">
+                  <a:extLst>
+                    <a:ext uri="{A12FA001-AC4F-418D-AE19-62706E023703}">
+                      <ahyp:hlinkClr xmlns:ahyp="http://schemas.microsoft.com/office/drawing/2018/hyperlinkcolor" val="tx"/>
+                    </a:ext>
+                  </a:extLst>
+                </a:hlinkClick>
+              </a:rPr>
+              <a:t>https://finviz.com/map.ashx</a:t>
+            </a:r>
+            <a:endParaRPr lang="it-IT" sz="1600" dirty="0">
+              <a:latin typeface="+mj-lt"/>
+            </a:endParaRPr>
+          </a:p>
+          <a:p>
+            <a:pPr marL="285750" indent="-285750">
+              <a:buFont typeface="Wingdings" panose="05000000000000000000" pitchFamily="2" charset="2"/>
+              <a:buChar char="v"/>
+            </a:pPr>
+            <a:r>
+              <a:rPr lang="it-IT" sz="1600" dirty="0">
+                <a:latin typeface="+mj-lt"/>
+                <a:hlinkClick r:id="rId9">
+                  <a:extLst>
+                    <a:ext uri="{A12FA001-AC4F-418D-AE19-62706E023703}">
+                      <ahyp:hlinkClr xmlns:ahyp="http://schemas.microsoft.com/office/drawing/2018/hyperlinkcolor" val="tx"/>
+                    </a:ext>
+                  </a:extLst>
+                </a:hlinkClick>
+              </a:rPr>
+              <a:t>https://homes.cs.washington.edu/~jfogarty/publications/gi2008.pdf</a:t>
+            </a:r>
+            <a:endParaRPr lang="it-IT" sz="1600" dirty="0">
+              <a:latin typeface="+mj-lt"/>
+            </a:endParaRPr>
+          </a:p>
+          <a:p>
+            <a:pPr marL="285750" indent="-285750">
+              <a:buFont typeface="Wingdings" panose="05000000000000000000" pitchFamily="2" charset="2"/>
+              <a:buChar char="v"/>
+            </a:pPr>
+            <a:r>
+              <a:rPr lang="it-IT" sz="1600" dirty="0">
+                <a:latin typeface="+mj-lt"/>
+                <a:hlinkClick r:id="rId10">
+                  <a:extLst>
+                    <a:ext uri="{A12FA001-AC4F-418D-AE19-62706E023703}">
+                      <ahyp:hlinkClr xmlns:ahyp="http://schemas.microsoft.com/office/drawing/2018/hyperlinkcolor" val="tx"/>
+                    </a:ext>
+                  </a:extLst>
+                </a:hlinkClick>
+              </a:rPr>
+              <a:t>https://pdfs.semanticscholar.org/727a/91e5ec6af61c9eb9007b59cdfdd5e575038a.pdf</a:t>
+            </a:r>
+            <a:endParaRPr lang="it-IT" sz="1600" dirty="0">
+              <a:latin typeface="+mj-lt"/>
+            </a:endParaRPr>
+          </a:p>
+          <a:p>
+            <a:pPr marL="285750" indent="-285750">
+              <a:buFont typeface="Wingdings" panose="05000000000000000000" pitchFamily="2" charset="2"/>
+              <a:buChar char="v"/>
+            </a:pPr>
+            <a:r>
+              <a:rPr lang="it-IT" sz="1600" dirty="0">
+                <a:latin typeface="+mj-lt"/>
+                <a:hlinkClick r:id="rId11">
+                  <a:extLst>
+                    <a:ext uri="{A12FA001-AC4F-418D-AE19-62706E023703}">
+                      <ahyp:hlinkClr xmlns:ahyp="http://schemas.microsoft.com/office/drawing/2018/hyperlinkcolor" val="tx"/>
+                    </a:ext>
+                  </a:extLst>
+                </a:hlinkClick>
+              </a:rPr>
+              <a:t>https://qz.com/278645/these-beautiful-works-of-art-were-made-using-algorithms/</a:t>
+            </a:r>
+            <a:endParaRPr lang="it-IT" sz="1600" dirty="0">
+              <a:latin typeface="+mj-lt"/>
+            </a:endParaRPr>
+          </a:p>
+          <a:p>
+            <a:pPr marL="285750" indent="-285750">
+              <a:buFont typeface="Wingdings" panose="05000000000000000000" pitchFamily="2" charset="2"/>
+              <a:buChar char="v"/>
+            </a:pPr>
+            <a:r>
+              <a:rPr lang="it-IT" sz="1600" dirty="0">
+                <a:latin typeface="+mj-lt"/>
+                <a:hlinkClick r:id="rId12">
+                  <a:extLst>
+                    <a:ext uri="{A12FA001-AC4F-418D-AE19-62706E023703}">
+                      <ahyp:hlinkClr xmlns:ahyp="http://schemas.microsoft.com/office/drawing/2018/hyperlinkcolor" val="tx"/>
+                    </a:ext>
+                  </a:extLst>
+                </a:hlinkClick>
+              </a:rPr>
+              <a:t>http://www.cpnas.org/exhibitions/archive/treemaps.pdf</a:t>
+            </a:r>
+            <a:endParaRPr lang="it-IT" sz="1600" dirty="0">
+              <a:latin typeface="+mj-lt"/>
+            </a:endParaRPr>
+          </a:p>
+        </p:txBody>
+      </p:sp>
+      <p:sp>
+        <p:nvSpPr>
+          <p:cNvPr id="10" name="TextBox 9">
+            <a:extLst>
+              <a:ext uri="{FF2B5EF4-FFF2-40B4-BE49-F238E27FC236}">
+                <a16:creationId xmlns:a16="http://schemas.microsoft.com/office/drawing/2014/main" id="{9DD77FED-C4D6-4B90-BA14-477EABBDA8D7}"/>
               </a:ext>
             </a:extLst>
           </p:cNvPr>
@@ -4848,8 +5625,8 @@
         </p:nvSpPr>
         <p:spPr>
           <a:xfrm>
-            <a:off x="2769502" y="1982253"/>
-            <a:ext cx="6652994" cy="369332"/>
+            <a:off x="2094832" y="628233"/>
+            <a:ext cx="8002335" cy="461665"/>
           </a:xfrm>
           <a:prstGeom prst="rect">
             <a:avLst/>
@@ -4878,938 +5655,12 @@
           <a:p>
             <a:pPr algn="ctr"/>
             <a:r>
-              <a:rPr lang="it-IT" dirty="0"/>
-              <a:t>Interazione: drill-down in una porzione della gerarchia</a:t>
-            </a:r>
-          </a:p>
-        </p:txBody>
-      </p:sp>
-      <p:sp>
-        <p:nvSpPr>
-          <p:cNvPr id="12" name="TextBox 11">
-            <a:extLst>
-              <a:ext uri="{FF2B5EF4-FFF2-40B4-BE49-F238E27FC236}">
-                <a16:creationId xmlns:a16="http://schemas.microsoft.com/office/drawing/2014/main" id="{517C0950-CA54-445B-9AA5-BDE88D1FF4AE}"/>
-              </a:ext>
-            </a:extLst>
-          </p:cNvPr>
-          <p:cNvSpPr txBox="1"/>
-          <p:nvPr/>
-        </p:nvSpPr>
-        <p:spPr>
-          <a:xfrm>
-            <a:off x="2769502" y="1609547"/>
-            <a:ext cx="6652994" cy="369332"/>
-          </a:xfrm>
-          <a:prstGeom prst="rect">
-            <a:avLst/>
-          </a:prstGeom>
-          <a:solidFill>
-            <a:schemeClr val="accent4">
-              <a:lumMod val="20000"/>
-              <a:lumOff val="80000"/>
-            </a:schemeClr>
-          </a:solidFill>
-          <a:ln w="38100">
-            <a:solidFill>
-              <a:schemeClr val="bg1"/>
-            </a:solidFill>
-          </a:ln>
-        </p:spPr>
-        <p:txBody>
-          <a:bodyPr wrap="square" rtlCol="0">
-            <a:spAutoFit/>
-          </a:bodyPr>
-          <a:lstStyle>
-            <a:defPPr>
-              <a:defRPr lang="it-IT"/>
-            </a:defPPr>
-          </a:lstStyle>
-          <a:p>
-            <a:pPr algn="ctr"/>
-            <a:r>
-              <a:rPr lang="it-IT" dirty="0"/>
-              <a:t>Parte della gerarchia è innestata a destra</a:t>
-            </a:r>
-          </a:p>
-        </p:txBody>
-      </p:sp>
-      <p:sp>
-        <p:nvSpPr>
-          <p:cNvPr id="13" name="TextBox 12">
-            <a:extLst>
-              <a:ext uri="{FF2B5EF4-FFF2-40B4-BE49-F238E27FC236}">
-                <a16:creationId xmlns:a16="http://schemas.microsoft.com/office/drawing/2014/main" id="{657FC0E2-1414-4A6C-B714-9EFA38E72EC1}"/>
-              </a:ext>
-            </a:extLst>
-          </p:cNvPr>
-          <p:cNvSpPr txBox="1"/>
-          <p:nvPr/>
-        </p:nvSpPr>
-        <p:spPr>
-          <a:xfrm>
-            <a:off x="2769502" y="2351715"/>
-            <a:ext cx="6652994" cy="369332"/>
-          </a:xfrm>
-          <a:prstGeom prst="rect">
-            <a:avLst/>
-          </a:prstGeom>
-          <a:solidFill>
-            <a:schemeClr val="accent2">
-              <a:lumMod val="20000"/>
-              <a:lumOff val="80000"/>
-            </a:schemeClr>
-          </a:solidFill>
-          <a:ln w="38100">
-            <a:solidFill>
-              <a:schemeClr val="bg1"/>
-            </a:solidFill>
-          </a:ln>
-        </p:spPr>
-        <p:txBody>
-          <a:bodyPr wrap="square" rtlCol="0">
-            <a:spAutoFit/>
-          </a:bodyPr>
-          <a:lstStyle>
-            <a:defPPr>
-              <a:defRPr lang="it-IT"/>
-            </a:defPPr>
-          </a:lstStyle>
-          <a:p>
-            <a:pPr algn="ctr"/>
-            <a:r>
-              <a:rPr lang="it-IT" dirty="0"/>
-              <a:t>Scopo: visualizzazione dei trend relativamente alla gerarchia</a:t>
-            </a:r>
-          </a:p>
-        </p:txBody>
-      </p:sp>
-      <p:sp>
-        <p:nvSpPr>
-          <p:cNvPr id="16" name="TextBox 15">
-            <a:extLst>
-              <a:ext uri="{FF2B5EF4-FFF2-40B4-BE49-F238E27FC236}">
-                <a16:creationId xmlns:a16="http://schemas.microsoft.com/office/drawing/2014/main" id="{8AB2F7A1-9E40-4EC8-8B25-5E2A8B15963D}"/>
-              </a:ext>
-            </a:extLst>
-          </p:cNvPr>
-          <p:cNvSpPr txBox="1"/>
-          <p:nvPr/>
-        </p:nvSpPr>
-        <p:spPr>
-          <a:xfrm>
-            <a:off x="0" y="0"/>
-            <a:ext cx="12192000" cy="830997"/>
-          </a:xfrm>
-          <a:prstGeom prst="rect">
-            <a:avLst/>
-          </a:prstGeom>
-          <a:noFill/>
-        </p:spPr>
-        <p:txBody>
-          <a:bodyPr wrap="square" rtlCol="0">
-            <a:spAutoFit/>
-          </a:bodyPr>
-          <a:lstStyle>
-            <a:defPPr>
-              <a:defRPr lang="it-IT"/>
-            </a:defPPr>
-            <a:lvl1pPr algn="ctr">
-              <a:defRPr sz="4800">
-                <a:latin typeface="Liberation Serif" panose="02020603050405020304" pitchFamily="18" charset="0"/>
-                <a:ea typeface="Liberation Serif" panose="02020603050405020304" pitchFamily="18" charset="0"/>
-                <a:cs typeface="Liberation Serif" panose="02020603050405020304" pitchFamily="18" charset="0"/>
-              </a:defRPr>
-            </a:lvl1pPr>
-          </a:lstStyle>
-          <a:p>
-            <a:r>
-              <a:rPr lang="it-IT" dirty="0"/>
-              <a:t>ICICLE GRAPH</a:t>
-            </a:r>
-          </a:p>
-        </p:txBody>
-      </p:sp>
-      <p:sp>
-        <p:nvSpPr>
-          <p:cNvPr id="17" name="Rectangle 16">
-            <a:extLst>
-              <a:ext uri="{FF2B5EF4-FFF2-40B4-BE49-F238E27FC236}">
-                <a16:creationId xmlns:a16="http://schemas.microsoft.com/office/drawing/2014/main" id="{182246A2-A21B-4714-AB79-0C8735AFF2FD}"/>
-              </a:ext>
-            </a:extLst>
-          </p:cNvPr>
-          <p:cNvSpPr/>
-          <p:nvPr/>
-        </p:nvSpPr>
-        <p:spPr>
-          <a:xfrm>
-            <a:off x="0" y="2721307"/>
-            <a:ext cx="6095999" cy="4140067"/>
-          </a:xfrm>
-          <a:prstGeom prst="rect">
-            <a:avLst/>
-          </a:prstGeom>
-          <a:solidFill>
-            <a:schemeClr val="tx2">
-              <a:lumMod val="20000"/>
-              <a:lumOff val="80000"/>
-            </a:schemeClr>
-          </a:solidFill>
-          <a:ln w="38100">
-            <a:solidFill>
-              <a:schemeClr val="bg1"/>
-            </a:solidFill>
-          </a:ln>
-        </p:spPr>
-        <p:style>
-          <a:lnRef idx="2">
-            <a:schemeClr val="accent1">
-              <a:shade val="50000"/>
-            </a:schemeClr>
-          </a:lnRef>
-          <a:fillRef idx="1">
-            <a:schemeClr val="accent1"/>
-          </a:fillRef>
-          <a:effectRef idx="0">
-            <a:schemeClr val="accent1"/>
-          </a:effectRef>
-          <a:fontRef idx="minor">
-            <a:schemeClr val="lt1"/>
-          </a:fontRef>
-        </p:style>
-        <p:txBody>
-          <a:bodyPr rtlCol="0" anchor="ctr"/>
-          <a:lstStyle/>
-          <a:p>
-            <a:pPr algn="ctr"/>
-            <a:endParaRPr lang="it-IT" dirty="0"/>
-          </a:p>
-        </p:txBody>
-      </p:sp>
-      <p:sp>
-        <p:nvSpPr>
-          <p:cNvPr id="6" name="TextBox 5">
-            <a:extLst>
-              <a:ext uri="{FF2B5EF4-FFF2-40B4-BE49-F238E27FC236}">
-                <a16:creationId xmlns:a16="http://schemas.microsoft.com/office/drawing/2014/main" id="{DE835881-8C61-48DD-8F8D-AC3348995363}"/>
-              </a:ext>
-            </a:extLst>
-          </p:cNvPr>
-          <p:cNvSpPr txBox="1"/>
-          <p:nvPr/>
-        </p:nvSpPr>
-        <p:spPr>
-          <a:xfrm>
-            <a:off x="0" y="2721307"/>
-            <a:ext cx="1254981" cy="369332"/>
-          </a:xfrm>
-          <a:prstGeom prst="rect">
-            <a:avLst/>
-          </a:prstGeom>
-          <a:solidFill>
-            <a:schemeClr val="tx2">
-              <a:lumMod val="20000"/>
-              <a:lumOff val="80000"/>
-            </a:schemeClr>
-          </a:solidFill>
-          <a:ln w="38100">
-            <a:solidFill>
-              <a:schemeClr val="bg1"/>
-            </a:solidFill>
-          </a:ln>
-        </p:spPr>
-        <p:txBody>
-          <a:bodyPr wrap="square" rtlCol="0">
-            <a:spAutoFit/>
-          </a:bodyPr>
-          <a:lstStyle>
-            <a:defPPr>
-              <a:defRPr lang="it-IT"/>
-            </a:defPPr>
-          </a:lstStyle>
-          <a:p>
-            <a:pPr algn="r"/>
-            <a:r>
-              <a:rPr lang="it-IT" dirty="0"/>
-              <a:t>PM10</a:t>
-            </a:r>
-          </a:p>
-        </p:txBody>
-      </p:sp>
-      <p:sp>
-        <p:nvSpPr>
-          <p:cNvPr id="18" name="Rectangle 17">
-            <a:extLst>
-              <a:ext uri="{FF2B5EF4-FFF2-40B4-BE49-F238E27FC236}">
-                <a16:creationId xmlns:a16="http://schemas.microsoft.com/office/drawing/2014/main" id="{453A263E-A374-42DC-BF8E-F0E94A0DA1E7}"/>
-              </a:ext>
-            </a:extLst>
-          </p:cNvPr>
-          <p:cNvSpPr/>
-          <p:nvPr/>
-        </p:nvSpPr>
-        <p:spPr>
-          <a:xfrm>
-            <a:off x="6095999" y="2721307"/>
-            <a:ext cx="6079686" cy="4140067"/>
-          </a:xfrm>
-          <a:prstGeom prst="rect">
-            <a:avLst/>
-          </a:prstGeom>
-          <a:solidFill>
-            <a:schemeClr val="tx2">
-              <a:lumMod val="20000"/>
-              <a:lumOff val="80000"/>
-            </a:schemeClr>
-          </a:solidFill>
-          <a:ln w="38100">
-            <a:solidFill>
-              <a:schemeClr val="bg1"/>
-            </a:solidFill>
-          </a:ln>
-        </p:spPr>
-        <p:style>
-          <a:lnRef idx="2">
-            <a:schemeClr val="accent1">
-              <a:shade val="50000"/>
-            </a:schemeClr>
-          </a:lnRef>
-          <a:fillRef idx="1">
-            <a:schemeClr val="accent1"/>
-          </a:fillRef>
-          <a:effectRef idx="0">
-            <a:schemeClr val="accent1"/>
-          </a:effectRef>
-          <a:fontRef idx="minor">
-            <a:schemeClr val="lt1"/>
-          </a:fontRef>
-        </p:style>
-        <p:txBody>
-          <a:bodyPr rtlCol="0" anchor="ctr"/>
-          <a:lstStyle/>
-          <a:p>
-            <a:pPr algn="ctr"/>
-            <a:endParaRPr lang="it-IT" dirty="0"/>
-          </a:p>
-        </p:txBody>
-      </p:sp>
-      <p:pic>
-        <p:nvPicPr>
-          <p:cNvPr id="2" name="Picture 1">
-            <a:extLst>
-              <a:ext uri="{FF2B5EF4-FFF2-40B4-BE49-F238E27FC236}">
-                <a16:creationId xmlns:a16="http://schemas.microsoft.com/office/drawing/2014/main" id="{480729BF-E37D-4EE8-BB3F-495DE9A36872}"/>
-              </a:ext>
-            </a:extLst>
-          </p:cNvPr>
-          <p:cNvPicPr>
-            <a:picLocks noChangeAspect="1"/>
-          </p:cNvPicPr>
-          <p:nvPr/>
-        </p:nvPicPr>
-        <p:blipFill>
-          <a:blip r:embed="rId4"/>
-          <a:stretch>
-            <a:fillRect/>
-          </a:stretch>
-        </p:blipFill>
-        <p:spPr>
-          <a:xfrm>
-            <a:off x="6129556" y="2926887"/>
-            <a:ext cx="4783223" cy="3728906"/>
-          </a:xfrm>
-          <a:prstGeom prst="rect">
-            <a:avLst/>
-          </a:prstGeom>
-        </p:spPr>
-      </p:pic>
-      <p:pic>
-        <p:nvPicPr>
-          <p:cNvPr id="4" name="Picture 3">
-            <a:extLst>
-              <a:ext uri="{FF2B5EF4-FFF2-40B4-BE49-F238E27FC236}">
-                <a16:creationId xmlns:a16="http://schemas.microsoft.com/office/drawing/2014/main" id="{F18E2021-5705-489C-B8B2-12D9AF3C54A7}"/>
-              </a:ext>
-            </a:extLst>
-          </p:cNvPr>
-          <p:cNvPicPr>
-            <a:picLocks noChangeAspect="1"/>
-          </p:cNvPicPr>
-          <p:nvPr/>
-        </p:nvPicPr>
-        <p:blipFill>
-          <a:blip r:embed="rId5"/>
-          <a:stretch>
-            <a:fillRect/>
-          </a:stretch>
-        </p:blipFill>
-        <p:spPr>
-          <a:xfrm>
-            <a:off x="1271296" y="2926887"/>
-            <a:ext cx="4799537" cy="3728906"/>
-          </a:xfrm>
-          <a:prstGeom prst="rect">
-            <a:avLst/>
-          </a:prstGeom>
-        </p:spPr>
-      </p:pic>
-      <p:sp>
-        <p:nvSpPr>
-          <p:cNvPr id="7" name="TextBox 6">
-            <a:extLst>
-              <a:ext uri="{FF2B5EF4-FFF2-40B4-BE49-F238E27FC236}">
-                <a16:creationId xmlns:a16="http://schemas.microsoft.com/office/drawing/2014/main" id="{7B0B4645-DA16-40F5-AC99-2BF507B43A29}"/>
-              </a:ext>
-            </a:extLst>
-          </p:cNvPr>
-          <p:cNvSpPr txBox="1"/>
-          <p:nvPr/>
-        </p:nvSpPr>
-        <p:spPr>
-          <a:xfrm>
-            <a:off x="10929093" y="2721307"/>
-            <a:ext cx="1262906" cy="369332"/>
-          </a:xfrm>
-          <a:prstGeom prst="rect">
-            <a:avLst/>
-          </a:prstGeom>
-          <a:solidFill>
-            <a:schemeClr val="tx2">
-              <a:lumMod val="20000"/>
-              <a:lumOff val="80000"/>
-            </a:schemeClr>
-          </a:solidFill>
-          <a:ln w="38100">
-            <a:solidFill>
-              <a:schemeClr val="bg1"/>
-            </a:solidFill>
-          </a:ln>
-        </p:spPr>
-        <p:txBody>
-          <a:bodyPr wrap="square" rtlCol="0">
-            <a:spAutoFit/>
-          </a:bodyPr>
-          <a:lstStyle>
-            <a:defPPr>
-              <a:defRPr lang="it-IT"/>
-            </a:defPPr>
-          </a:lstStyle>
-          <a:p>
-            <a:r>
-              <a:rPr lang="it-IT" dirty="0"/>
-              <a:t>Ozono</a:t>
-            </a:r>
-          </a:p>
-        </p:txBody>
-      </p:sp>
-      <p:cxnSp>
-        <p:nvCxnSpPr>
-          <p:cNvPr id="21" name="Straight Connector 20">
-            <a:extLst>
-              <a:ext uri="{FF2B5EF4-FFF2-40B4-BE49-F238E27FC236}">
-                <a16:creationId xmlns:a16="http://schemas.microsoft.com/office/drawing/2014/main" id="{DDE4F5A0-51C3-40E5-9150-ABE96C64BCE8}"/>
-              </a:ext>
-            </a:extLst>
-          </p:cNvPr>
-          <p:cNvCxnSpPr>
-            <a:cxnSpLocks/>
-          </p:cNvCxnSpPr>
-          <p:nvPr/>
-        </p:nvCxnSpPr>
-        <p:spPr>
-          <a:xfrm>
-            <a:off x="1580099" y="789052"/>
-            <a:ext cx="9023755" cy="0"/>
-          </a:xfrm>
-          <a:prstGeom prst="line">
-            <a:avLst/>
-          </a:prstGeom>
-          <a:ln w="38100" cap="sq" cmpd="thickThin">
-            <a:solidFill>
-              <a:schemeClr val="accent2"/>
-            </a:solidFill>
-            <a:prstDash val="solid"/>
-            <a:miter lim="800000"/>
-          </a:ln>
-        </p:spPr>
-        <p:style>
-          <a:lnRef idx="3">
-            <a:schemeClr val="accent2"/>
-          </a:lnRef>
-          <a:fillRef idx="0">
-            <a:schemeClr val="accent2"/>
-          </a:fillRef>
-          <a:effectRef idx="2">
-            <a:schemeClr val="accent2"/>
-          </a:effectRef>
-          <a:fontRef idx="minor">
-            <a:schemeClr val="tx1"/>
-          </a:fontRef>
-        </p:style>
-      </p:cxnSp>
-      <p:sp>
-        <p:nvSpPr>
-          <p:cNvPr id="22" name="Action Button: Return 21">
-            <a:hlinkClick r:id="rId6" highlightClick="1"/>
-            <a:extLst>
-              <a:ext uri="{FF2B5EF4-FFF2-40B4-BE49-F238E27FC236}">
-                <a16:creationId xmlns:a16="http://schemas.microsoft.com/office/drawing/2014/main" id="{C408AFD2-D4FF-46EA-9B3B-3BAAAC7C7DFC}"/>
-              </a:ext>
-            </a:extLst>
-          </p:cNvPr>
-          <p:cNvSpPr/>
-          <p:nvPr/>
-        </p:nvSpPr>
-        <p:spPr>
-          <a:xfrm rot="5400000">
-            <a:off x="11822667" y="6488667"/>
-            <a:ext cx="369332" cy="369332"/>
-          </a:xfrm>
-          <a:prstGeom prst="actionButtonReturn">
-            <a:avLst/>
-          </a:prstGeom>
-        </p:spPr>
-        <p:style>
-          <a:lnRef idx="1">
-            <a:schemeClr val="accent2"/>
-          </a:lnRef>
-          <a:fillRef idx="2">
-            <a:schemeClr val="accent2"/>
-          </a:fillRef>
-          <a:effectRef idx="1">
-            <a:schemeClr val="accent2"/>
-          </a:effectRef>
-          <a:fontRef idx="minor">
-            <a:schemeClr val="dk1"/>
-          </a:fontRef>
-        </p:style>
-        <p:txBody>
-          <a:bodyPr rtlCol="0" anchor="ctr"/>
-          <a:lstStyle/>
-          <a:p>
-            <a:pPr algn="ctr"/>
-            <a:endParaRPr lang="it-IT"/>
-          </a:p>
-        </p:txBody>
-      </p:sp>
-      <p:sp>
-        <p:nvSpPr>
-          <p:cNvPr id="23" name="Action Button: Return 22">
-            <a:hlinkClick r:id="rId7" highlightClick="1"/>
-            <a:extLst>
-              <a:ext uri="{FF2B5EF4-FFF2-40B4-BE49-F238E27FC236}">
-                <a16:creationId xmlns:a16="http://schemas.microsoft.com/office/drawing/2014/main" id="{78AA24FB-41CD-4745-9872-BC5E9402CF12}"/>
-              </a:ext>
-            </a:extLst>
-          </p:cNvPr>
-          <p:cNvSpPr/>
-          <p:nvPr/>
-        </p:nvSpPr>
-        <p:spPr>
-          <a:xfrm rot="5400000">
-            <a:off x="-1" y="6488668"/>
-            <a:ext cx="369332" cy="369332"/>
-          </a:xfrm>
-          <a:prstGeom prst="actionButtonReturn">
-            <a:avLst/>
-          </a:prstGeom>
-        </p:spPr>
-        <p:style>
-          <a:lnRef idx="1">
-            <a:schemeClr val="accent2"/>
-          </a:lnRef>
-          <a:fillRef idx="2">
-            <a:schemeClr val="accent2"/>
-          </a:fillRef>
-          <a:effectRef idx="1">
-            <a:schemeClr val="accent2"/>
-          </a:effectRef>
-          <a:fontRef idx="minor">
-            <a:schemeClr val="dk1"/>
-          </a:fontRef>
-        </p:style>
-        <p:txBody>
-          <a:bodyPr rtlCol="0" anchor="ctr"/>
-          <a:lstStyle/>
-          <a:p>
-            <a:pPr algn="ctr"/>
-            <a:endParaRPr lang="it-IT"/>
-          </a:p>
-        </p:txBody>
-      </p:sp>
-    </p:spTree>
-    <p:extLst>
-      <p:ext uri="{BB962C8B-B14F-4D97-AF65-F5344CB8AC3E}">
-        <p14:creationId xmlns:p14="http://schemas.microsoft.com/office/powerpoint/2010/main" val="849370008"/>
-      </p:ext>
-    </p:extLst>
-  </p:cSld>
-  <p:clrMapOvr>
-    <a:masterClrMapping/>
-  </p:clrMapOvr>
-</p:sld>
-</file>
-
-<file path=ppt/slides/slide13.xml><?xml version="1.0" encoding="utf-8"?>
-<p:sld xmlns:a="http://schemas.openxmlformats.org/drawingml/2006/main" xmlns:r="http://schemas.openxmlformats.org/officeDocument/2006/relationships" xmlns:p="http://schemas.openxmlformats.org/presentationml/2006/main">
-  <p:cSld>
-    <p:spTree>
-      <p:nvGrpSpPr>
-        <p:cNvPr id="1" name=""/>
-        <p:cNvGrpSpPr/>
-        <p:nvPr/>
-      </p:nvGrpSpPr>
-      <p:grpSpPr>
-        <a:xfrm>
-          <a:off x="0" y="0"/>
-          <a:ext cx="0" cy="0"/>
-          <a:chOff x="0" y="0"/>
-          <a:chExt cx="0" cy="0"/>
-        </a:xfrm>
-      </p:grpSpPr>
-      <p:pic>
-        <p:nvPicPr>
-          <p:cNvPr id="9" name="Picture 4">
-            <a:extLst>
-              <a:ext uri="{FF2B5EF4-FFF2-40B4-BE49-F238E27FC236}">
-                <a16:creationId xmlns:a16="http://schemas.microsoft.com/office/drawing/2014/main" id="{DF4E3FBD-CFD3-46EA-973D-463B7FD85E60}"/>
-              </a:ext>
-            </a:extLst>
-          </p:cNvPr>
-          <p:cNvPicPr>
-            <a:picLocks noChangeAspect="1" noChangeArrowheads="1"/>
-          </p:cNvPicPr>
-          <p:nvPr/>
-        </p:nvPicPr>
-        <p:blipFill rotWithShape="1">
-          <a:blip r:embed="rId2">
-            <a:alphaModFix/>
-            <a:extLst>
-              <a:ext uri="{BEBA8EAE-BF5A-486C-A8C5-ECC9F3942E4B}">
-                <a14:imgProps xmlns:a14="http://schemas.microsoft.com/office/drawing/2010/main">
-                  <a14:imgLayer r:embed="rId3">
-                    <a14:imgEffect>
-                      <a14:sharpenSoften amount="25000"/>
-                    </a14:imgEffect>
-                  </a14:imgLayer>
-                </a14:imgProps>
-              </a:ext>
-              <a:ext uri="{28A0092B-C50C-407E-A947-70E740481C1C}">
-                <a14:useLocalDpi xmlns:a14="http://schemas.microsoft.com/office/drawing/2010/main" val="0"/>
-              </a:ext>
-            </a:extLst>
-          </a:blip>
-          <a:srcRect t="24299"/>
-          <a:stretch/>
-        </p:blipFill>
-        <p:spPr bwMode="auto">
-          <a:xfrm>
-            <a:off x="0" y="0"/>
-            <a:ext cx="12192000" cy="6858000"/>
-          </a:xfrm>
-          <a:prstGeom prst="rect">
-            <a:avLst/>
-          </a:prstGeom>
-          <a:noFill/>
-          <a:extLst>
-            <a:ext uri="{909E8E84-426E-40DD-AFC4-6F175D3DCCD1}">
-              <a14:hiddenFill xmlns:a14="http://schemas.microsoft.com/office/drawing/2010/main">
-                <a:solidFill>
-                  <a:srgbClr val="FFFFFF"/>
-                </a:solidFill>
-              </a14:hiddenFill>
-            </a:ext>
-          </a:extLst>
-        </p:spPr>
-      </p:pic>
-      <p:sp>
-        <p:nvSpPr>
-          <p:cNvPr id="2" name="Rectangle 1">
-            <a:extLst>
-              <a:ext uri="{FF2B5EF4-FFF2-40B4-BE49-F238E27FC236}">
-                <a16:creationId xmlns:a16="http://schemas.microsoft.com/office/drawing/2014/main" id="{3D34911B-1C94-4C55-82FB-3DB0FBC0F3DC}"/>
-              </a:ext>
-            </a:extLst>
-          </p:cNvPr>
-          <p:cNvSpPr/>
-          <p:nvPr/>
-        </p:nvSpPr>
-        <p:spPr>
-          <a:xfrm>
-            <a:off x="2094833" y="1089898"/>
-            <a:ext cx="8002335" cy="2339102"/>
-          </a:xfrm>
-          <a:prstGeom prst="rect">
-            <a:avLst/>
-          </a:prstGeom>
-          <a:solidFill>
-            <a:schemeClr val="accent5">
-              <a:lumMod val="20000"/>
-              <a:lumOff val="80000"/>
-            </a:schemeClr>
-          </a:solidFill>
-          <a:ln w="38100">
-            <a:solidFill>
-              <a:schemeClr val="bg1"/>
-            </a:solidFill>
-          </a:ln>
-        </p:spPr>
-        <p:txBody>
-          <a:bodyPr wrap="square" rtlCol="0">
-            <a:spAutoFit/>
-          </a:bodyPr>
-          <a:lstStyle/>
-          <a:p>
-            <a:pPr marL="285750" indent="-285750">
-              <a:buFont typeface="Wingdings" panose="05000000000000000000" pitchFamily="2" charset="2"/>
-              <a:buChar char="v"/>
-            </a:pPr>
-            <a:r>
-              <a:rPr lang="it-IT" sz="1600" dirty="0">
-                <a:latin typeface="+mj-lt"/>
-                <a:hlinkClick r:id="rId4">
-                  <a:extLst>
-                    <a:ext uri="{A12FA001-AC4F-418D-AE19-62706E023703}">
-                      <ahyp:hlinkClr xmlns:ahyp="http://schemas.microsoft.com/office/drawing/2018/hyperlinkcolor" val="tx"/>
-                    </a:ext>
-                  </a:extLst>
-                </a:hlinkClick>
-              </a:rPr>
-              <a:t>https://observablehq.com/@d3/tidy-tree</a:t>
-            </a:r>
-            <a:endParaRPr lang="it-IT" sz="1600" dirty="0">
-              <a:latin typeface="+mj-lt"/>
-            </a:endParaRPr>
-          </a:p>
-          <a:p>
-            <a:pPr marL="285750" indent="-285750">
-              <a:buFont typeface="Wingdings" panose="05000000000000000000" pitchFamily="2" charset="2"/>
-              <a:buChar char="v"/>
-            </a:pPr>
-            <a:r>
-              <a:rPr lang="it-IT" sz="1600" dirty="0">
-                <a:latin typeface="+mj-lt"/>
-                <a:hlinkClick r:id="rId5">
-                  <a:extLst>
-                    <a:ext uri="{A12FA001-AC4F-418D-AE19-62706E023703}">
-                      <ahyp:hlinkClr xmlns:ahyp="http://schemas.microsoft.com/office/drawing/2018/hyperlinkcolor" val="tx"/>
-                    </a:ext>
-                  </a:extLst>
-                </a:hlinkClick>
-              </a:rPr>
-              <a:t>https://observablehq.com/@d3/treemap</a:t>
-            </a:r>
-            <a:endParaRPr lang="it-IT" sz="1600" dirty="0">
-              <a:latin typeface="+mj-lt"/>
-            </a:endParaRPr>
-          </a:p>
-          <a:p>
-            <a:pPr marL="285750" indent="-285750">
-              <a:buFont typeface="Wingdings" panose="05000000000000000000" pitchFamily="2" charset="2"/>
-              <a:buChar char="v"/>
-            </a:pPr>
-            <a:r>
-              <a:rPr lang="it-IT" sz="1600" dirty="0">
-                <a:latin typeface="+mj-lt"/>
-                <a:hlinkClick r:id="rId6">
-                  <a:extLst>
-                    <a:ext uri="{A12FA001-AC4F-418D-AE19-62706E023703}">
-                      <ahyp:hlinkClr xmlns:ahyp="http://schemas.microsoft.com/office/drawing/2018/hyperlinkcolor" val="tx"/>
-                    </a:ext>
-                  </a:extLst>
-                </a:hlinkClick>
-              </a:rPr>
-              <a:t>https://www.cs.umd.edu/hcil/treemap-history</a:t>
-            </a:r>
-            <a:endParaRPr lang="it-IT" sz="1600" dirty="0">
-              <a:latin typeface="+mj-lt"/>
-            </a:endParaRPr>
-          </a:p>
-          <a:p>
-            <a:pPr marL="285750" indent="-285750">
-              <a:buFont typeface="Wingdings" panose="05000000000000000000" pitchFamily="2" charset="2"/>
-              <a:buChar char="v"/>
-            </a:pPr>
-            <a:r>
-              <a:rPr lang="it-IT" sz="1600" dirty="0">
-                <a:latin typeface="+mj-lt"/>
-                <a:hlinkClick r:id="rId7">
-                  <a:extLst>
-                    <a:ext uri="{A12FA001-AC4F-418D-AE19-62706E023703}">
-                      <ahyp:hlinkClr xmlns:ahyp="http://schemas.microsoft.com/office/drawing/2018/hyperlinkcolor" val="tx"/>
-                    </a:ext>
-                  </a:extLst>
-                </a:hlinkClick>
-              </a:rPr>
-              <a:t>https://newsmap-js.herokuapp.com</a:t>
-            </a:r>
-            <a:endParaRPr lang="it-IT" sz="1600" dirty="0">
-              <a:latin typeface="+mj-lt"/>
-            </a:endParaRPr>
-          </a:p>
-          <a:p>
-            <a:pPr marL="285750" indent="-285750">
-              <a:buFont typeface="Wingdings" panose="05000000000000000000" pitchFamily="2" charset="2"/>
-              <a:buChar char="v"/>
-            </a:pPr>
-            <a:r>
-              <a:rPr lang="it-IT" sz="1600" dirty="0">
-                <a:latin typeface="+mj-lt"/>
-                <a:hlinkClick r:id="rId8">
-                  <a:extLst>
-                    <a:ext uri="{A12FA001-AC4F-418D-AE19-62706E023703}">
-                      <ahyp:hlinkClr xmlns:ahyp="http://schemas.microsoft.com/office/drawing/2018/hyperlinkcolor" val="tx"/>
-                    </a:ext>
-                  </a:extLst>
-                </a:hlinkClick>
-              </a:rPr>
-              <a:t>https://finviz.com/map.ashx</a:t>
-            </a:r>
-            <a:endParaRPr lang="it-IT" sz="1600" dirty="0">
-              <a:latin typeface="+mj-lt"/>
-            </a:endParaRPr>
-          </a:p>
-          <a:p>
-            <a:pPr marL="285750" indent="-285750">
-              <a:buFont typeface="Wingdings" panose="05000000000000000000" pitchFamily="2" charset="2"/>
-              <a:buChar char="v"/>
-            </a:pPr>
-            <a:r>
-              <a:rPr lang="it-IT" sz="1600" dirty="0">
-                <a:latin typeface="+mj-lt"/>
-                <a:hlinkClick r:id="rId9">
-                  <a:extLst>
-                    <a:ext uri="{A12FA001-AC4F-418D-AE19-62706E023703}">
-                      <ahyp:hlinkClr xmlns:ahyp="http://schemas.microsoft.com/office/drawing/2018/hyperlinkcolor" val="tx"/>
-                    </a:ext>
-                  </a:extLst>
-                </a:hlinkClick>
-              </a:rPr>
-              <a:t>https://homes.cs.washington.edu/~jfogarty/publications/gi2008.pdf</a:t>
-            </a:r>
-            <a:endParaRPr lang="it-IT" sz="1600" dirty="0">
-              <a:latin typeface="+mj-lt"/>
-            </a:endParaRPr>
-          </a:p>
-          <a:p>
-            <a:pPr marL="285750" indent="-285750">
-              <a:buFont typeface="Wingdings" panose="05000000000000000000" pitchFamily="2" charset="2"/>
-              <a:buChar char="v"/>
-            </a:pPr>
-            <a:r>
-              <a:rPr lang="it-IT" sz="1600" dirty="0">
-                <a:latin typeface="+mj-lt"/>
-                <a:hlinkClick r:id="rId10">
-                  <a:extLst>
-                    <a:ext uri="{A12FA001-AC4F-418D-AE19-62706E023703}">
-                      <ahyp:hlinkClr xmlns:ahyp="http://schemas.microsoft.com/office/drawing/2018/hyperlinkcolor" val="tx"/>
-                    </a:ext>
-                  </a:extLst>
-                </a:hlinkClick>
-              </a:rPr>
-              <a:t>https://pdfs.semanticscholar.org/727a/91e5ec6af61c9eb9007b59cdfdd5e575038a.pdf</a:t>
-            </a:r>
-            <a:endParaRPr lang="it-IT" sz="1600" dirty="0">
-              <a:latin typeface="+mj-lt"/>
-            </a:endParaRPr>
-          </a:p>
-          <a:p>
-            <a:pPr marL="285750" indent="-285750">
-              <a:buFont typeface="Wingdings" panose="05000000000000000000" pitchFamily="2" charset="2"/>
-              <a:buChar char="v"/>
-            </a:pPr>
-            <a:r>
-              <a:rPr lang="it-IT" sz="1600" dirty="0">
-                <a:latin typeface="+mj-lt"/>
-                <a:hlinkClick r:id="rId11">
-                  <a:extLst>
-                    <a:ext uri="{A12FA001-AC4F-418D-AE19-62706E023703}">
-                      <ahyp:hlinkClr xmlns:ahyp="http://schemas.microsoft.com/office/drawing/2018/hyperlinkcolor" val="tx"/>
-                    </a:ext>
-                  </a:extLst>
-                </a:hlinkClick>
-              </a:rPr>
-              <a:t>https://qz.com/278645/these-beautiful-works-of-art-were-made-using-algorithms/</a:t>
-            </a:r>
-            <a:endParaRPr lang="it-IT" sz="1600" dirty="0">
-              <a:latin typeface="+mj-lt"/>
-            </a:endParaRPr>
-          </a:p>
-          <a:p>
-            <a:pPr marL="285750" indent="-285750">
-              <a:buFont typeface="Wingdings" panose="05000000000000000000" pitchFamily="2" charset="2"/>
-              <a:buChar char="v"/>
-            </a:pPr>
-            <a:r>
-              <a:rPr lang="it-IT" sz="1600" dirty="0">
-                <a:latin typeface="+mj-lt"/>
-                <a:hlinkClick r:id="rId12">
-                  <a:extLst>
-                    <a:ext uri="{A12FA001-AC4F-418D-AE19-62706E023703}">
-                      <ahyp:hlinkClr xmlns:ahyp="http://schemas.microsoft.com/office/drawing/2018/hyperlinkcolor" val="tx"/>
-                    </a:ext>
-                  </a:extLst>
-                </a:hlinkClick>
-              </a:rPr>
-              <a:t>http://www.cpnas.org/exhibitions/archive/treemaps.pdf</a:t>
-            </a:r>
-            <a:endParaRPr lang="it-IT" sz="1600" dirty="0">
-              <a:latin typeface="+mj-lt"/>
-            </a:endParaRPr>
-          </a:p>
-        </p:txBody>
-      </p:sp>
-      <p:sp>
-        <p:nvSpPr>
-          <p:cNvPr id="10" name="TextBox 9">
-            <a:extLst>
-              <a:ext uri="{FF2B5EF4-FFF2-40B4-BE49-F238E27FC236}">
-                <a16:creationId xmlns:a16="http://schemas.microsoft.com/office/drawing/2014/main" id="{9DD77FED-C4D6-4B90-BA14-477EABBDA8D7}"/>
-              </a:ext>
-            </a:extLst>
-          </p:cNvPr>
-          <p:cNvSpPr txBox="1"/>
-          <p:nvPr/>
-        </p:nvSpPr>
-        <p:spPr>
-          <a:xfrm>
-            <a:off x="2094832" y="628233"/>
-            <a:ext cx="8002335" cy="461665"/>
-          </a:xfrm>
-          <a:prstGeom prst="rect">
-            <a:avLst/>
-          </a:prstGeom>
-          <a:solidFill>
-            <a:schemeClr val="accent6">
-              <a:lumMod val="20000"/>
-              <a:lumOff val="80000"/>
-            </a:schemeClr>
-          </a:solidFill>
-          <a:ln w="38100">
-            <a:solidFill>
-              <a:schemeClr val="bg1"/>
-            </a:solidFill>
-          </a:ln>
-        </p:spPr>
-        <p:txBody>
-          <a:bodyPr wrap="square" rtlCol="0">
-            <a:spAutoFit/>
-          </a:bodyPr>
-          <a:lstStyle>
-            <a:defPPr>
-              <a:defRPr lang="it-IT"/>
-            </a:defPPr>
-          </a:lstStyle>
-          <a:p>
-            <a:pPr algn="ctr"/>
-            <a:r>
               <a:rPr lang="it-IT" sz="2400" dirty="0">
                 <a:latin typeface="Liberation Serif" panose="02020603050405020304" pitchFamily="18" charset="0"/>
                 <a:ea typeface="Liberation Serif" panose="02020603050405020304" pitchFamily="18" charset="0"/>
                 <a:cs typeface="Liberation Serif" panose="02020603050405020304" pitchFamily="18" charset="0"/>
               </a:rPr>
-              <a:t>Riferimenti</a:t>
+              <a:t>Riferimenti (in ordine di comparsa)</a:t>
             </a:r>
           </a:p>
         </p:txBody>
@@ -5827,7 +5678,7 @@
 </p:sld>
 </file>
 
-<file path=ppt/slides/slide14.xml><?xml version="1.0" encoding="utf-8"?>
+<file path=ppt/slides/slide13.xml><?xml version="1.0" encoding="utf-8"?>
 <p:sld xmlns:a="http://schemas.openxmlformats.org/drawingml/2006/main" xmlns:r="http://schemas.openxmlformats.org/officeDocument/2006/relationships" xmlns:p="http://schemas.openxmlformats.org/presentationml/2006/main">
   <p:cSld>
     <p:spTree>
@@ -7977,10 +7828,10 @@
       </p:grpSpPr>
       <p:pic>
         <p:nvPicPr>
-          <p:cNvPr id="17" name="Picture 4">
-            <a:extLst>
-              <a:ext uri="{FF2B5EF4-FFF2-40B4-BE49-F238E27FC236}">
-                <a16:creationId xmlns:a16="http://schemas.microsoft.com/office/drawing/2014/main" id="{6939F97B-E284-4E2A-8169-73E875B47C2D}"/>
+          <p:cNvPr id="18" name="Picture 4">
+            <a:extLst>
+              <a:ext uri="{FF2B5EF4-FFF2-40B4-BE49-F238E27FC236}">
+                <a16:creationId xmlns:a16="http://schemas.microsoft.com/office/drawing/2014/main" id="{BB193E7C-B1E2-4ED2-80F4-B2EDCA42AC47}"/>
               </a:ext>
             </a:extLst>
           </p:cNvPr>
@@ -8033,59 +7884,10 @@
       </p:pic>
       <p:sp>
         <p:nvSpPr>
-          <p:cNvPr id="9" name="TextBox 8">
-            <a:extLst>
-              <a:ext uri="{FF2B5EF4-FFF2-40B4-BE49-F238E27FC236}">
-                <a16:creationId xmlns:a16="http://schemas.microsoft.com/office/drawing/2014/main" id="{CEC1B127-8301-4539-93E4-DE04C81806B4}"/>
-              </a:ext>
-            </a:extLst>
-          </p:cNvPr>
-          <p:cNvSpPr txBox="1"/>
-          <p:nvPr/>
-        </p:nvSpPr>
-        <p:spPr>
-          <a:xfrm>
-            <a:off x="427837" y="1333787"/>
-            <a:ext cx="5254629" cy="369332"/>
-          </a:xfrm>
-          <a:prstGeom prst="rect">
-            <a:avLst/>
-          </a:prstGeom>
-          <a:solidFill>
-            <a:schemeClr val="accent6">
-              <a:lumMod val="20000"/>
-              <a:lumOff val="80000"/>
-            </a:schemeClr>
-          </a:solidFill>
-          <a:ln w="38100">
-            <a:solidFill>
-              <a:schemeClr val="bg1"/>
-            </a:solidFill>
-          </a:ln>
-        </p:spPr>
-        <p:txBody>
-          <a:bodyPr wrap="square" rtlCol="0">
-            <a:spAutoFit/>
-          </a:bodyPr>
-          <a:lstStyle>
-            <a:defPPr>
-              <a:defRPr lang="it-IT"/>
-            </a:defPPr>
-          </a:lstStyle>
-          <a:p>
-            <a:r>
-              <a:rPr lang="it-IT" dirty="0"/>
-              <a:t>Paradigma di programmazione di tipo dichiarativo</a:t>
-            </a:r>
-          </a:p>
-        </p:txBody>
-      </p:sp>
-      <p:sp>
-        <p:nvSpPr>
           <p:cNvPr id="11" name="TextBox 10">
             <a:extLst>
               <a:ext uri="{FF2B5EF4-FFF2-40B4-BE49-F238E27FC236}">
-                <a16:creationId xmlns:a16="http://schemas.microsoft.com/office/drawing/2014/main" id="{85DE0A53-A2A2-444B-90B4-ADAF99FD9D6A}"/>
+                <a16:creationId xmlns:a16="http://schemas.microsoft.com/office/drawing/2014/main" id="{E4BBF90F-DA08-41E4-A16E-1BFCF831EF39}"/>
               </a:ext>
             </a:extLst>
           </p:cNvPr>
@@ -8121,7 +7923,7 @@
           <a:p>
             <a:r>
               <a:rPr lang="it-IT" dirty="0"/>
-              <a:t>PROGRAMMAZIONE FUNZIONALE: D3JS</a:t>
+              <a:t>APPLICAZIONE: INQUINAMENTO</a:t>
             </a:r>
           </a:p>
         </p:txBody>
@@ -8131,7 +7933,7 @@
           <p:cNvPr id="12" name="TextBox 11">
             <a:extLst>
               <a:ext uri="{FF2B5EF4-FFF2-40B4-BE49-F238E27FC236}">
-                <a16:creationId xmlns:a16="http://schemas.microsoft.com/office/drawing/2014/main" id="{40956401-AA90-44B3-82BE-DA4D370061AB}"/>
+                <a16:creationId xmlns:a16="http://schemas.microsoft.com/office/drawing/2014/main" id="{937E82BD-5B88-4FE4-9396-1ED1CF7E22F4}"/>
               </a:ext>
             </a:extLst>
           </p:cNvPr>
@@ -8140,8 +7942,106 @@
         </p:nvSpPr>
         <p:spPr>
           <a:xfrm>
-            <a:off x="427837" y="1708196"/>
-            <a:ext cx="5254629" cy="2031325"/>
+            <a:off x="427839" y="1338864"/>
+            <a:ext cx="6370039" cy="369332"/>
+          </a:xfrm>
+          <a:prstGeom prst="rect">
+            <a:avLst/>
+          </a:prstGeom>
+          <a:solidFill>
+            <a:schemeClr val="accent6">
+              <a:lumMod val="20000"/>
+              <a:lumOff val="80000"/>
+            </a:schemeClr>
+          </a:solidFill>
+          <a:ln w="38100">
+            <a:solidFill>
+              <a:schemeClr val="bg1"/>
+            </a:solidFill>
+          </a:ln>
+        </p:spPr>
+        <p:txBody>
+          <a:bodyPr wrap="square" rtlCol="0">
+            <a:spAutoFit/>
+          </a:bodyPr>
+          <a:lstStyle>
+            <a:defPPr>
+              <a:defRPr lang="it-IT"/>
+            </a:defPPr>
+          </a:lstStyle>
+          <a:p>
+            <a:r>
+              <a:rPr lang="it-IT" dirty="0"/>
+              <a:t>La gerarchia è il tempo (date delle rilevazioni)</a:t>
+            </a:r>
+          </a:p>
+        </p:txBody>
+      </p:sp>
+      <p:sp>
+        <p:nvSpPr>
+          <p:cNvPr id="13" name="TextBox 12">
+            <a:extLst>
+              <a:ext uri="{FF2B5EF4-FFF2-40B4-BE49-F238E27FC236}">
+                <a16:creationId xmlns:a16="http://schemas.microsoft.com/office/drawing/2014/main" id="{9FB0B5FA-E611-4134-B141-9261571004AA}"/>
+              </a:ext>
+            </a:extLst>
+          </p:cNvPr>
+          <p:cNvSpPr txBox="1"/>
+          <p:nvPr/>
+        </p:nvSpPr>
+        <p:spPr>
+          <a:xfrm>
+            <a:off x="427839" y="1708196"/>
+            <a:ext cx="6370039" cy="369332"/>
+          </a:xfrm>
+          <a:prstGeom prst="rect">
+            <a:avLst/>
+          </a:prstGeom>
+          <a:solidFill>
+            <a:schemeClr val="accent5">
+              <a:lumMod val="20000"/>
+              <a:lumOff val="80000"/>
+            </a:schemeClr>
+          </a:solidFill>
+          <a:ln w="38100">
+            <a:solidFill>
+              <a:schemeClr val="bg1"/>
+            </a:solidFill>
+          </a:ln>
+        </p:spPr>
+        <p:txBody>
+          <a:bodyPr wrap="square" rtlCol="0">
+            <a:spAutoFit/>
+          </a:bodyPr>
+          <a:lstStyle>
+            <a:defPPr>
+              <a:defRPr lang="it-IT"/>
+            </a:defPPr>
+          </a:lstStyle>
+          <a:p>
+            <a:r>
+              <a:rPr lang="it-IT" dirty="0"/>
+              <a:t>Dataset originale lineare (formato CSV)</a:t>
+            </a:r>
+          </a:p>
+        </p:txBody>
+      </p:sp>
+      <p:sp>
+        <p:nvSpPr>
+          <p:cNvPr id="14" name="TextBox 13">
+            <a:extLst>
+              <a:ext uri="{FF2B5EF4-FFF2-40B4-BE49-F238E27FC236}">
+                <a16:creationId xmlns:a16="http://schemas.microsoft.com/office/drawing/2014/main" id="{137C1E9D-C71A-49E7-AB97-D68D9AB0E095}"/>
+              </a:ext>
+            </a:extLst>
+          </p:cNvPr>
+          <p:cNvSpPr txBox="1"/>
+          <p:nvPr/>
+        </p:nvSpPr>
+        <p:spPr>
+          <a:xfrm>
+            <a:off x="427838" y="2077528"/>
+            <a:ext cx="6370039" cy="923330"/>
           </a:xfrm>
           <a:prstGeom prst="rect">
             <a:avLst/>
@@ -8162,11 +8062,15 @@
           <a:bodyPr wrap="square" rtlCol="0">
             <a:spAutoFit/>
           </a:bodyPr>
-          <a:lstStyle/>
+          <a:lstStyle>
+            <a:defPPr>
+              <a:defRPr lang="it-IT"/>
+            </a:defPPr>
+          </a:lstStyle>
           <a:p>
             <a:r>
               <a:rPr lang="it-IT" dirty="0"/>
-              <a:t>«Le funzioni sono cittadini di prima classe»</a:t>
+              <a:t>Principale problematica: gerarchizzazione del dataset</a:t>
             </a:r>
           </a:p>
           <a:p>
@@ -8176,47 +8080,17 @@
             </a:pPr>
             <a:r>
               <a:rPr lang="it-IT" dirty="0"/>
-              <a:t>Possono essere passate come argomenti e restituite</a:t>
-            </a:r>
-          </a:p>
-          <a:p>
-            <a:pPr marL="285750" indent="-285750">
-              <a:buFont typeface="Arial" panose="020B0604020202020204" pitchFamily="34" charset="0"/>
-              <a:buChar char="•"/>
-            </a:pPr>
-            <a:r>
-              <a:rPr lang="it-IT" dirty="0"/>
-              <a:t>Possono essere variabili</a:t>
-            </a:r>
-          </a:p>
-          <a:p>
-            <a:pPr marL="285750" indent="-285750">
-              <a:buFont typeface="Arial" panose="020B0604020202020204" pitchFamily="34" charset="0"/>
-              <a:buChar char="•"/>
-            </a:pPr>
-            <a:r>
-              <a:rPr lang="it-IT" dirty="0"/>
-              <a:t>Ricca funzionalità per interagirvi (ad es. composizione, funzioni anonime)</a:t>
-            </a:r>
-          </a:p>
-          <a:p>
-            <a:pPr marL="285750" indent="-285750">
-              <a:buFont typeface="Arial" panose="020B0604020202020204" pitchFamily="34" charset="0"/>
-              <a:buChar char="•"/>
-            </a:pPr>
-            <a:r>
-              <a:rPr lang="it-IT" dirty="0"/>
-              <a:t>Ricorsione come principale controllo di flusso</a:t>
-            </a:r>
-          </a:p>
-        </p:txBody>
-      </p:sp>
-      <p:sp>
-        <p:nvSpPr>
-          <p:cNvPr id="13" name="TextBox 12">
-            <a:extLst>
-              <a:ext uri="{FF2B5EF4-FFF2-40B4-BE49-F238E27FC236}">
-                <a16:creationId xmlns:a16="http://schemas.microsoft.com/office/drawing/2014/main" id="{A1D79EAE-2520-4133-ADA3-71296541AE1A}"/>
+              <a:t>Uso di script in Java per effettuare parsing di date e osservazioni e generare la gerarchia in JSON</a:t>
+            </a:r>
+          </a:p>
+        </p:txBody>
+      </p:sp>
+      <p:sp>
+        <p:nvSpPr>
+          <p:cNvPr id="17" name="TextBox 16">
+            <a:extLst>
+              <a:ext uri="{FF2B5EF4-FFF2-40B4-BE49-F238E27FC236}">
+                <a16:creationId xmlns:a16="http://schemas.microsoft.com/office/drawing/2014/main" id="{E4B1E6F7-B8F5-476F-8666-3C3181658F50}"/>
               </a:ext>
             </a:extLst>
           </p:cNvPr>
@@ -8225,8 +8099,8 @@
         </p:nvSpPr>
         <p:spPr>
           <a:xfrm>
-            <a:off x="427836" y="3709089"/>
-            <a:ext cx="5254629" cy="1200329"/>
+            <a:off x="427838" y="3000858"/>
+            <a:ext cx="6370039" cy="923330"/>
           </a:xfrm>
           <a:prstGeom prst="rect">
             <a:avLst/>
@@ -8247,11 +8121,15 @@
           <a:bodyPr wrap="square" rtlCol="0">
             <a:spAutoFit/>
           </a:bodyPr>
-          <a:lstStyle/>
+          <a:lstStyle>
+            <a:defPPr>
+              <a:defRPr lang="it-IT"/>
+            </a:defPPr>
+          </a:lstStyle>
           <a:p>
             <a:r>
               <a:rPr lang="it-IT" dirty="0"/>
-              <a:t>Quasi nessun linguaggio funzionale è puramente funzionale</a:t>
+              <a:t>Necessità di generare gerarchie diverse a seconda della visualizzazione utilizzata</a:t>
             </a:r>
           </a:p>
           <a:p>
@@ -8261,17 +8139,17 @@
             </a:pPr>
             <a:r>
               <a:rPr lang="it-IT" dirty="0"/>
-              <a:t>Esempio: Javascript supporta comunque la programmazione imperativa tradizionale</a:t>
-            </a:r>
-          </a:p>
-        </p:txBody>
-      </p:sp>
-      <p:sp>
-        <p:nvSpPr>
-          <p:cNvPr id="44" name="Rectangle 43">
-            <a:extLst>
-              <a:ext uri="{FF2B5EF4-FFF2-40B4-BE49-F238E27FC236}">
-                <a16:creationId xmlns:a16="http://schemas.microsoft.com/office/drawing/2014/main" id="{EE988FA7-D948-4ABF-B7A3-373B669ABB6A}"/>
+              <a:t>Esempio: le treemap non supportano i dati qualitativi</a:t>
+            </a:r>
+          </a:p>
+        </p:txBody>
+      </p:sp>
+      <p:sp>
+        <p:nvSpPr>
+          <p:cNvPr id="19" name="Rectangle 18">
+            <a:extLst>
+              <a:ext uri="{FF2B5EF4-FFF2-40B4-BE49-F238E27FC236}">
+                <a16:creationId xmlns:a16="http://schemas.microsoft.com/office/drawing/2014/main" id="{98B593E9-50C1-45DB-B7BA-E06DD929F20B}"/>
               </a:ext>
             </a:extLst>
           </p:cNvPr>
@@ -8280,15 +8158,16 @@
         </p:nvSpPr>
         <p:spPr>
           <a:xfrm>
-            <a:off x="5682468" y="1333789"/>
-            <a:ext cx="6509531" cy="5524211"/>
+            <a:off x="6797878" y="830996"/>
+            <a:ext cx="5394122" cy="6027003"/>
           </a:xfrm>
           <a:prstGeom prst="rect">
             <a:avLst/>
           </a:prstGeom>
           <a:solidFill>
-            <a:schemeClr val="bg1">
-              <a:lumMod val="95000"/>
+            <a:schemeClr val="tx2">
+              <a:lumMod val="20000"/>
+              <a:lumOff val="80000"/>
             </a:schemeClr>
           </a:solidFill>
           <a:ln w="38100">
@@ -8322,628 +8201,72 @@
           </a:p>
         </p:txBody>
       </p:sp>
-      <p:sp>
-        <p:nvSpPr>
-          <p:cNvPr id="14" name="TextBox 13">
-            <a:extLst>
-              <a:ext uri="{FF2B5EF4-FFF2-40B4-BE49-F238E27FC236}">
-                <a16:creationId xmlns:a16="http://schemas.microsoft.com/office/drawing/2014/main" id="{6B27E6C3-CD4E-40AC-8583-BCE14E1FFF61}"/>
-              </a:ext>
-            </a:extLst>
-          </p:cNvPr>
-          <p:cNvSpPr txBox="1"/>
-          <p:nvPr/>
-        </p:nvSpPr>
-        <p:spPr>
-          <a:xfrm>
-            <a:off x="6096000" y="1333787"/>
-            <a:ext cx="6095997" cy="369332"/>
+      <p:pic>
+        <p:nvPicPr>
+          <p:cNvPr id="4" name="Picture 3">
+            <a:extLst>
+              <a:ext uri="{FF2B5EF4-FFF2-40B4-BE49-F238E27FC236}">
+                <a16:creationId xmlns:a16="http://schemas.microsoft.com/office/drawing/2014/main" id="{40C79E73-7101-400C-BB6C-BDAA0CD26887}"/>
+              </a:ext>
+            </a:extLst>
+          </p:cNvPr>
+          <p:cNvPicPr>
+            <a:picLocks noChangeAspect="1"/>
+          </p:cNvPicPr>
+          <p:nvPr/>
+        </p:nvPicPr>
+        <p:blipFill>
+          <a:blip r:embed="rId4"/>
+          <a:stretch>
+            <a:fillRect/>
+          </a:stretch>
+        </p:blipFill>
+        <p:spPr>
+          <a:xfrm>
+            <a:off x="7147733" y="986825"/>
+            <a:ext cx="4694412" cy="2773970"/>
           </a:xfrm>
           <a:prstGeom prst="rect">
             <a:avLst/>
           </a:prstGeom>
-          <a:solidFill>
-            <a:schemeClr val="accent5">
-              <a:lumMod val="20000"/>
-              <a:lumOff val="80000"/>
-            </a:schemeClr>
-          </a:solidFill>
-          <a:ln w="38100">
-            <a:solidFill>
-              <a:schemeClr val="bg1"/>
-            </a:solidFill>
-          </a:ln>
-        </p:spPr>
-        <p:txBody>
-          <a:bodyPr wrap="square" rtlCol="0">
-            <a:spAutoFit/>
-          </a:bodyPr>
-          <a:lstStyle/>
-          <a:p>
-            <a:r>
-              <a:rPr lang="it-IT" dirty="0"/>
-              <a:t>Esempio di codice funzionale in D3JS:</a:t>
-            </a:r>
-          </a:p>
-        </p:txBody>
-      </p:sp>
-      <p:sp>
-        <p:nvSpPr>
-          <p:cNvPr id="16" name="TextBox 15">
-            <a:extLst>
-              <a:ext uri="{FF2B5EF4-FFF2-40B4-BE49-F238E27FC236}">
-                <a16:creationId xmlns:a16="http://schemas.microsoft.com/office/drawing/2014/main" id="{EC8EF103-7C24-41E5-90C9-42D1836C6A7C}"/>
-              </a:ext>
-            </a:extLst>
-          </p:cNvPr>
-          <p:cNvSpPr txBox="1"/>
-          <p:nvPr/>
-        </p:nvSpPr>
-        <p:spPr>
-          <a:xfrm>
-            <a:off x="6095997" y="1703119"/>
-            <a:ext cx="5896062" cy="830997"/>
+        </p:spPr>
+      </p:pic>
+      <p:pic>
+        <p:nvPicPr>
+          <p:cNvPr id="3" name="Picture 2">
+            <a:extLst>
+              <a:ext uri="{FF2B5EF4-FFF2-40B4-BE49-F238E27FC236}">
+                <a16:creationId xmlns:a16="http://schemas.microsoft.com/office/drawing/2014/main" id="{9993B78F-3F8F-4643-9FCC-76FE6D9A5E10}"/>
+              </a:ext>
+            </a:extLst>
+          </p:cNvPr>
+          <p:cNvPicPr>
+            <a:picLocks noChangeAspect="1"/>
+          </p:cNvPicPr>
+          <p:nvPr/>
+        </p:nvPicPr>
+        <p:blipFill>
+          <a:blip r:embed="rId5"/>
+          <a:stretch>
+            <a:fillRect/>
+          </a:stretch>
+        </p:blipFill>
+        <p:spPr>
+          <a:xfrm>
+            <a:off x="7147733" y="3924188"/>
+            <a:ext cx="4694412" cy="2770417"/>
           </a:xfrm>
           <a:prstGeom prst="rect">
             <a:avLst/>
           </a:prstGeom>
-          <a:noFill/>
-        </p:spPr>
-        <p:txBody>
-          <a:bodyPr wrap="square" rtlCol="0">
-            <a:spAutoFit/>
-          </a:bodyPr>
-          <a:lstStyle/>
-          <a:p>
-            <a:r>
-              <a:rPr lang="it-IT" sz="1200" dirty="0">
-                <a:latin typeface="Consolas" panose="020B0609020204030204" pitchFamily="49" charset="0"/>
-              </a:rPr>
-              <a:t>nodeEnter</a:t>
-            </a:r>
-            <a:r>
-              <a:rPr lang="it-IT" sz="1200" dirty="0">
-                <a:solidFill>
-                  <a:schemeClr val="accent1">
-                    <a:lumMod val="75000"/>
-                  </a:schemeClr>
-                </a:solidFill>
-                <a:latin typeface="Consolas" panose="020B0609020204030204" pitchFamily="49" charset="0"/>
-              </a:rPr>
-              <a:t>.append</a:t>
-            </a:r>
-            <a:r>
-              <a:rPr lang="it-IT" sz="1200" dirty="0">
-                <a:latin typeface="Consolas" panose="020B0609020204030204" pitchFamily="49" charset="0"/>
-              </a:rPr>
-              <a:t>("text")</a:t>
-            </a:r>
-          </a:p>
-          <a:p>
-            <a:r>
-              <a:rPr lang="it-IT" sz="1200" dirty="0">
-                <a:latin typeface="Consolas" panose="020B0609020204030204" pitchFamily="49" charset="0"/>
-              </a:rPr>
-              <a:t>	// […]</a:t>
-            </a:r>
-          </a:p>
-          <a:p>
-            <a:r>
-              <a:rPr lang="it-IT" sz="1200" dirty="0">
-                <a:latin typeface="Consolas" panose="020B0609020204030204" pitchFamily="49" charset="0"/>
-              </a:rPr>
-              <a:t>	.attr("text-anchor", </a:t>
-            </a:r>
-            <a:r>
-              <a:rPr lang="it-IT" sz="1200" dirty="0">
-                <a:solidFill>
-                  <a:schemeClr val="accent2">
-                    <a:lumMod val="75000"/>
-                  </a:schemeClr>
-                </a:solidFill>
-                <a:latin typeface="Consolas" panose="020B0609020204030204" pitchFamily="49" charset="0"/>
-              </a:rPr>
-              <a:t>d </a:t>
-            </a:r>
-            <a:r>
-              <a:rPr lang="it-IT" sz="1200" dirty="0">
-                <a:solidFill>
-                  <a:schemeClr val="accent2">
-                    <a:lumMod val="75000"/>
-                  </a:schemeClr>
-                </a:solidFill>
-                <a:highlight>
-                  <a:srgbClr val="FFFF00"/>
-                </a:highlight>
-                <a:latin typeface="Consolas" panose="020B0609020204030204" pitchFamily="49" charset="0"/>
-              </a:rPr>
-              <a:t>=&gt;</a:t>
-            </a:r>
-            <a:r>
-              <a:rPr lang="it-IT" sz="1200" dirty="0">
-                <a:solidFill>
-                  <a:schemeClr val="accent2">
-                    <a:lumMod val="75000"/>
-                  </a:schemeClr>
-                </a:solidFill>
-                <a:latin typeface="Consolas" panose="020B0609020204030204" pitchFamily="49" charset="0"/>
-              </a:rPr>
-              <a:t> d._children ? "end" : "start"</a:t>
-            </a:r>
-            <a:r>
-              <a:rPr lang="it-IT" sz="1200" dirty="0">
-                <a:latin typeface="Consolas" panose="020B0609020204030204" pitchFamily="49" charset="0"/>
-              </a:rPr>
-              <a:t>)</a:t>
-            </a:r>
-          </a:p>
-          <a:p>
-            <a:r>
-              <a:rPr lang="it-IT" sz="1200" dirty="0">
-                <a:latin typeface="Consolas" panose="020B0609020204030204" pitchFamily="49" charset="0"/>
-              </a:rPr>
-              <a:t>	.attr("fill", </a:t>
-            </a:r>
-            <a:r>
-              <a:rPr lang="it-IT" sz="1200" dirty="0">
-                <a:solidFill>
-                  <a:schemeClr val="accent6">
-                    <a:lumMod val="75000"/>
-                  </a:schemeClr>
-                </a:solidFill>
-                <a:latin typeface="Consolas" panose="020B0609020204030204" pitchFamily="49" charset="0"/>
-              </a:rPr>
-              <a:t>(d </a:t>
-            </a:r>
-            <a:r>
-              <a:rPr lang="it-IT" sz="1200" dirty="0">
-                <a:solidFill>
-                  <a:schemeClr val="accent6">
-                    <a:lumMod val="75000"/>
-                  </a:schemeClr>
-                </a:solidFill>
-                <a:highlight>
-                  <a:srgbClr val="FFFF00"/>
-                </a:highlight>
-                <a:latin typeface="Consolas" panose="020B0609020204030204" pitchFamily="49" charset="0"/>
-              </a:rPr>
-              <a:t>=&gt;</a:t>
-            </a:r>
-            <a:r>
-              <a:rPr lang="it-IT" sz="1200" dirty="0">
-                <a:solidFill>
-                  <a:schemeClr val="accent6">
-                    <a:lumMod val="75000"/>
-                  </a:schemeClr>
-                </a:solidFill>
-                <a:latin typeface="Consolas" panose="020B0609020204030204" pitchFamily="49" charset="0"/>
-              </a:rPr>
-              <a:t> color(d.data.name))</a:t>
-            </a:r>
-            <a:r>
-              <a:rPr lang="it-IT" sz="1200" dirty="0">
-                <a:latin typeface="Consolas" panose="020B0609020204030204" pitchFamily="49" charset="0"/>
-              </a:rPr>
-              <a:t>)</a:t>
-            </a:r>
-          </a:p>
-        </p:txBody>
-      </p:sp>
-      <p:sp>
-        <p:nvSpPr>
-          <p:cNvPr id="30" name="Freeform: Shape 29">
-            <a:extLst>
-              <a:ext uri="{FF2B5EF4-FFF2-40B4-BE49-F238E27FC236}">
-                <a16:creationId xmlns:a16="http://schemas.microsoft.com/office/drawing/2014/main" id="{B2ADC935-5C07-4C5E-A605-65DAD31750A3}"/>
-              </a:ext>
-            </a:extLst>
-          </p:cNvPr>
-          <p:cNvSpPr/>
-          <p:nvPr/>
-        </p:nvSpPr>
-        <p:spPr>
-          <a:xfrm>
-            <a:off x="6242806" y="1918806"/>
-            <a:ext cx="713726" cy="914400"/>
-          </a:xfrm>
-          <a:custGeom>
-            <a:avLst/>
-            <a:gdLst>
-              <a:gd name="connsiteX0" fmla="*/ 588558 w 588558"/>
-              <a:gd name="connsiteY0" fmla="*/ 0 h 914400"/>
-              <a:gd name="connsiteX1" fmla="*/ 51663 w 588558"/>
-              <a:gd name="connsiteY1" fmla="*/ 385894 h 914400"/>
-              <a:gd name="connsiteX2" fmla="*/ 51663 w 588558"/>
-              <a:gd name="connsiteY2" fmla="*/ 914400 h 914400"/>
-            </a:gdLst>
-            <a:ahLst/>
-            <a:cxnLst>
-              <a:cxn ang="0">
-                <a:pos x="connsiteX0" y="connsiteY0"/>
-              </a:cxn>
-              <a:cxn ang="0">
-                <a:pos x="connsiteX1" y="connsiteY1"/>
-              </a:cxn>
-              <a:cxn ang="0">
-                <a:pos x="connsiteX2" y="connsiteY2"/>
-              </a:cxn>
-            </a:cxnLst>
-            <a:rect l="l" t="t" r="r" b="b"/>
-            <a:pathLst>
-              <a:path w="588558" h="914400">
-                <a:moveTo>
-                  <a:pt x="588558" y="0"/>
-                </a:moveTo>
-                <a:cubicBezTo>
-                  <a:pt x="364851" y="116747"/>
-                  <a:pt x="141145" y="233494"/>
-                  <a:pt x="51663" y="385894"/>
-                </a:cubicBezTo>
-                <a:cubicBezTo>
-                  <a:pt x="-37820" y="538294"/>
-                  <a:pt x="6921" y="726347"/>
-                  <a:pt x="51663" y="914400"/>
-                </a:cubicBezTo>
-              </a:path>
-            </a:pathLst>
-          </a:custGeom>
-          <a:ln w="12700" cap="flat" cmpd="sng" algn="ctr">
-            <a:solidFill>
-              <a:schemeClr val="accent1"/>
-            </a:solidFill>
-            <a:prstDash val="solid"/>
-            <a:round/>
-            <a:headEnd type="none" w="med" len="med"/>
-            <a:tailEnd type="arrow" w="med" len="med"/>
-          </a:ln>
-        </p:spPr>
-        <p:style>
-          <a:lnRef idx="0">
-            <a:scrgbClr r="0" g="0" b="0"/>
-          </a:lnRef>
-          <a:fillRef idx="0">
-            <a:scrgbClr r="0" g="0" b="0"/>
-          </a:fillRef>
-          <a:effectRef idx="0">
-            <a:scrgbClr r="0" g="0" b="0"/>
-          </a:effectRef>
-          <a:fontRef idx="minor">
-            <a:schemeClr val="tx1"/>
-          </a:fontRef>
-        </p:style>
-        <p:txBody>
-          <a:bodyPr rtlCol="0" anchor="ctr"/>
-          <a:lstStyle/>
-          <a:p>
-            <a:pPr algn="ctr"/>
-            <a:endParaRPr lang="it-IT">
-              <a:solidFill>
-                <a:schemeClr val="accent1">
-                  <a:lumMod val="75000"/>
-                </a:schemeClr>
-              </a:solidFill>
-            </a:endParaRPr>
-          </a:p>
-        </p:txBody>
-      </p:sp>
-      <p:sp>
-        <p:nvSpPr>
-          <p:cNvPr id="32" name="TextBox 31">
-            <a:extLst>
-              <a:ext uri="{FF2B5EF4-FFF2-40B4-BE49-F238E27FC236}">
-                <a16:creationId xmlns:a16="http://schemas.microsoft.com/office/drawing/2014/main" id="{FCC5EC22-848D-4E04-9699-51A730A55330}"/>
-              </a:ext>
-            </a:extLst>
-          </p:cNvPr>
-          <p:cNvSpPr txBox="1"/>
-          <p:nvPr/>
-        </p:nvSpPr>
-        <p:spPr>
-          <a:xfrm>
-            <a:off x="6148420" y="2833206"/>
-            <a:ext cx="3470248" cy="338554"/>
-          </a:xfrm>
-          <a:prstGeom prst="rect">
-            <a:avLst/>
-          </a:prstGeom>
-          <a:noFill/>
-          <a:ln w="3175">
-            <a:solidFill>
-              <a:schemeClr val="accent1">
-                <a:lumMod val="75000"/>
-              </a:schemeClr>
-            </a:solidFill>
-          </a:ln>
-        </p:spPr>
-        <p:txBody>
-          <a:bodyPr wrap="square" rtlCol="0">
-            <a:spAutoFit/>
-          </a:bodyPr>
-          <a:lstStyle/>
-          <a:p>
-            <a:r>
-              <a:rPr lang="it-IT" sz="1600" dirty="0"/>
-              <a:t>Funzionalità D3JS (aggiunta elementi)</a:t>
-            </a:r>
-          </a:p>
-        </p:txBody>
-      </p:sp>
-      <p:sp>
-        <p:nvSpPr>
-          <p:cNvPr id="33" name="TextBox 32">
-            <a:extLst>
-              <a:ext uri="{FF2B5EF4-FFF2-40B4-BE49-F238E27FC236}">
-                <a16:creationId xmlns:a16="http://schemas.microsoft.com/office/drawing/2014/main" id="{56EB238C-82AB-4189-905E-8C8BDCD6A22A}"/>
-              </a:ext>
-            </a:extLst>
-          </p:cNvPr>
-          <p:cNvSpPr txBox="1"/>
-          <p:nvPr/>
-        </p:nvSpPr>
-        <p:spPr>
-          <a:xfrm>
-            <a:off x="6148420" y="3895994"/>
-            <a:ext cx="1914794" cy="338554"/>
-          </a:xfrm>
-          <a:prstGeom prst="rect">
-            <a:avLst/>
-          </a:prstGeom>
-          <a:noFill/>
-          <a:ln w="3175">
-            <a:solidFill>
-              <a:schemeClr val="accent2">
-                <a:lumMod val="75000"/>
-              </a:schemeClr>
-            </a:solidFill>
-          </a:ln>
-        </p:spPr>
-        <p:txBody>
-          <a:bodyPr wrap="square" rtlCol="0">
-            <a:spAutoFit/>
-          </a:bodyPr>
-          <a:lstStyle/>
-          <a:p>
-            <a:r>
-              <a:rPr lang="it-IT" sz="1600" dirty="0"/>
-              <a:t>Funzione anonima</a:t>
-            </a:r>
-          </a:p>
-        </p:txBody>
-      </p:sp>
-      <p:sp>
-        <p:nvSpPr>
-          <p:cNvPr id="34" name="TextBox 33">
-            <a:extLst>
-              <a:ext uri="{FF2B5EF4-FFF2-40B4-BE49-F238E27FC236}">
-                <a16:creationId xmlns:a16="http://schemas.microsoft.com/office/drawing/2014/main" id="{0970D6CC-9A8B-4A56-9847-7E0EB15AA594}"/>
-              </a:ext>
-            </a:extLst>
-          </p:cNvPr>
-          <p:cNvSpPr txBox="1"/>
-          <p:nvPr/>
-        </p:nvSpPr>
-        <p:spPr>
-          <a:xfrm>
-            <a:off x="6148420" y="3370535"/>
-            <a:ext cx="2475461" cy="338554"/>
-          </a:xfrm>
-          <a:prstGeom prst="rect">
-            <a:avLst/>
-          </a:prstGeom>
-          <a:noFill/>
-          <a:ln w="3175">
-            <a:solidFill>
-              <a:schemeClr val="accent6">
-                <a:lumMod val="75000"/>
-              </a:schemeClr>
-            </a:solidFill>
-          </a:ln>
-        </p:spPr>
-        <p:txBody>
-          <a:bodyPr wrap="square" rtlCol="0">
-            <a:spAutoFit/>
-          </a:bodyPr>
-          <a:lstStyle/>
-          <a:p>
-            <a:r>
-              <a:rPr lang="it-IT" sz="1600" dirty="0"/>
-              <a:t>Funzione come argomento</a:t>
-            </a:r>
-          </a:p>
-        </p:txBody>
-      </p:sp>
-      <p:sp>
-        <p:nvSpPr>
-          <p:cNvPr id="37" name="Freeform: Shape 36">
-            <a:extLst>
-              <a:ext uri="{FF2B5EF4-FFF2-40B4-BE49-F238E27FC236}">
-                <a16:creationId xmlns:a16="http://schemas.microsoft.com/office/drawing/2014/main" id="{CC0452EF-D5A4-4D61-8878-DEA90C7F62F9}"/>
-              </a:ext>
-            </a:extLst>
-          </p:cNvPr>
-          <p:cNvSpPr/>
-          <p:nvPr/>
-        </p:nvSpPr>
-        <p:spPr>
-          <a:xfrm>
-            <a:off x="8623881" y="2488140"/>
-            <a:ext cx="1646712" cy="1075211"/>
-          </a:xfrm>
-          <a:custGeom>
-            <a:avLst/>
-            <a:gdLst>
-              <a:gd name="connsiteX0" fmla="*/ 1493241 w 1636927"/>
-              <a:gd name="connsiteY0" fmla="*/ 0 h 1040235"/>
-              <a:gd name="connsiteX1" fmla="*/ 1493241 w 1636927"/>
-              <a:gd name="connsiteY1" fmla="*/ 645952 h 1040235"/>
-              <a:gd name="connsiteX2" fmla="*/ 0 w 1636927"/>
-              <a:gd name="connsiteY2" fmla="*/ 1040235 h 1040235"/>
-            </a:gdLst>
-            <a:ahLst/>
-            <a:cxnLst>
-              <a:cxn ang="0">
-                <a:pos x="connsiteX0" y="connsiteY0"/>
-              </a:cxn>
-              <a:cxn ang="0">
-                <a:pos x="connsiteX1" y="connsiteY1"/>
-              </a:cxn>
-              <a:cxn ang="0">
-                <a:pos x="connsiteX2" y="connsiteY2"/>
-              </a:cxn>
-            </a:cxnLst>
-            <a:rect l="l" t="t" r="r" b="b"/>
-            <a:pathLst>
-              <a:path w="1636927" h="1040235">
-                <a:moveTo>
-                  <a:pt x="1493241" y="0"/>
-                </a:moveTo>
-                <a:cubicBezTo>
-                  <a:pt x="1617677" y="236290"/>
-                  <a:pt x="1742114" y="472580"/>
-                  <a:pt x="1493241" y="645952"/>
-                </a:cubicBezTo>
-                <a:cubicBezTo>
-                  <a:pt x="1244368" y="819324"/>
-                  <a:pt x="321578" y="936771"/>
-                  <a:pt x="0" y="1040235"/>
-                </a:cubicBezTo>
-              </a:path>
-            </a:pathLst>
-          </a:custGeom>
-          <a:ln w="12700" cap="flat" cmpd="sng" algn="ctr">
-            <a:solidFill>
-              <a:schemeClr val="accent6">
-                <a:lumMod val="75000"/>
-              </a:schemeClr>
-            </a:solidFill>
-            <a:prstDash val="solid"/>
-            <a:round/>
-            <a:headEnd type="none" w="med" len="med"/>
-            <a:tailEnd type="arrow" w="med" len="med"/>
-          </a:ln>
-        </p:spPr>
-        <p:style>
-          <a:lnRef idx="0">
-            <a:scrgbClr r="0" g="0" b="0"/>
-          </a:lnRef>
-          <a:fillRef idx="0">
-            <a:scrgbClr r="0" g="0" b="0"/>
-          </a:fillRef>
-          <a:effectRef idx="0">
-            <a:scrgbClr r="0" g="0" b="0"/>
-          </a:effectRef>
-          <a:fontRef idx="minor">
-            <a:schemeClr val="tx1"/>
-          </a:fontRef>
-        </p:style>
-        <p:txBody>
-          <a:bodyPr rtlCol="0" anchor="ctr"/>
-          <a:lstStyle/>
-          <a:p>
-            <a:pPr algn="ctr"/>
-            <a:endParaRPr lang="it-IT"/>
-          </a:p>
-        </p:txBody>
-      </p:sp>
-      <p:sp>
-        <p:nvSpPr>
-          <p:cNvPr id="41" name="Freeform: Shape 40">
-            <a:extLst>
-              <a:ext uri="{FF2B5EF4-FFF2-40B4-BE49-F238E27FC236}">
-                <a16:creationId xmlns:a16="http://schemas.microsoft.com/office/drawing/2014/main" id="{4C18B383-1AE0-438C-80A8-9FB5666245FE}"/>
-              </a:ext>
-            </a:extLst>
-          </p:cNvPr>
-          <p:cNvSpPr/>
-          <p:nvPr/>
-        </p:nvSpPr>
-        <p:spPr>
-          <a:xfrm>
-            <a:off x="8063215" y="2320361"/>
-            <a:ext cx="3401001" cy="1744910"/>
-          </a:xfrm>
-          <a:custGeom>
-            <a:avLst/>
-            <a:gdLst>
-              <a:gd name="connsiteX0" fmla="*/ 3338818 w 3401001"/>
-              <a:gd name="connsiteY0" fmla="*/ 0 h 1744910"/>
-              <a:gd name="connsiteX1" fmla="*/ 2952925 w 3401001"/>
-              <a:gd name="connsiteY1" fmla="*/ 1098958 h 1744910"/>
-              <a:gd name="connsiteX2" fmla="*/ 0 w 3401001"/>
-              <a:gd name="connsiteY2" fmla="*/ 1744910 h 1744910"/>
-            </a:gdLst>
-            <a:ahLst/>
-            <a:cxnLst>
-              <a:cxn ang="0">
-                <a:pos x="connsiteX0" y="connsiteY0"/>
-              </a:cxn>
-              <a:cxn ang="0">
-                <a:pos x="connsiteX1" y="connsiteY1"/>
-              </a:cxn>
-              <a:cxn ang="0">
-                <a:pos x="connsiteX2" y="connsiteY2"/>
-              </a:cxn>
-            </a:cxnLst>
-            <a:rect l="l" t="t" r="r" b="b"/>
-            <a:pathLst>
-              <a:path w="3401001" h="1744910">
-                <a:moveTo>
-                  <a:pt x="3338818" y="0"/>
-                </a:moveTo>
-                <a:cubicBezTo>
-                  <a:pt x="3424106" y="404070"/>
-                  <a:pt x="3509395" y="808140"/>
-                  <a:pt x="2952925" y="1098958"/>
-                </a:cubicBezTo>
-                <a:cubicBezTo>
-                  <a:pt x="2396455" y="1389776"/>
-                  <a:pt x="1198227" y="1567343"/>
-                  <a:pt x="0" y="1744910"/>
-                </a:cubicBezTo>
-              </a:path>
-            </a:pathLst>
-          </a:custGeom>
-          <a:ln w="12700" cap="flat" cmpd="sng" algn="ctr">
-            <a:solidFill>
-              <a:schemeClr val="accent2">
-                <a:lumMod val="75000"/>
-              </a:schemeClr>
-            </a:solidFill>
-            <a:prstDash val="solid"/>
-            <a:round/>
-            <a:headEnd type="none" w="med" len="med"/>
-            <a:tailEnd type="arrow" w="med" len="med"/>
-          </a:ln>
-        </p:spPr>
-        <p:style>
-          <a:lnRef idx="0">
-            <a:scrgbClr r="0" g="0" b="0"/>
-          </a:lnRef>
-          <a:fillRef idx="0">
-            <a:scrgbClr r="0" g="0" b="0"/>
-          </a:fillRef>
-          <a:effectRef idx="0">
-            <a:scrgbClr r="0" g="0" b="0"/>
-          </a:effectRef>
-          <a:fontRef idx="minor">
-            <a:schemeClr val="tx1"/>
-          </a:fontRef>
-        </p:style>
-        <p:txBody>
-          <a:bodyPr rtlCol="0" anchor="ctr"/>
-          <a:lstStyle/>
-          <a:p>
-            <a:pPr algn="ctr"/>
-            <a:endParaRPr lang="it-IT"/>
-          </a:p>
-        </p:txBody>
-      </p:sp>
+        </p:spPr>
+      </p:pic>
       <p:cxnSp>
         <p:nvCxnSpPr>
-          <p:cNvPr id="21" name="Straight Connector 20">
-            <a:extLst>
-              <a:ext uri="{FF2B5EF4-FFF2-40B4-BE49-F238E27FC236}">
-                <a16:creationId xmlns:a16="http://schemas.microsoft.com/office/drawing/2014/main" id="{846BFF3D-2CDA-48DC-ABDA-15473F528DA0}"/>
+          <p:cNvPr id="22" name="Straight Connector 21">
+            <a:extLst>
+              <a:ext uri="{FF2B5EF4-FFF2-40B4-BE49-F238E27FC236}">
+                <a16:creationId xmlns:a16="http://schemas.microsoft.com/office/drawing/2014/main" id="{55034513-FB26-4C24-93CD-26CEA100770E}"/>
               </a:ext>
             </a:extLst>
           </p:cNvPr>
@@ -8986,7 +8309,7 @@
     </p:spTree>
     <p:extLst>
       <p:ext uri="{BB962C8B-B14F-4D97-AF65-F5344CB8AC3E}">
-        <p14:creationId xmlns:p14="http://schemas.microsoft.com/office/powerpoint/2010/main" val="2198262502"/>
+        <p14:creationId xmlns:p14="http://schemas.microsoft.com/office/powerpoint/2010/main" val="3264423421"/>
       </p:ext>
     </p:extLst>
   </p:cSld>
@@ -9015,10 +8338,10 @@
       </p:grpSpPr>
       <p:pic>
         <p:nvPicPr>
-          <p:cNvPr id="18" name="Picture 4">
-            <a:extLst>
-              <a:ext uri="{FF2B5EF4-FFF2-40B4-BE49-F238E27FC236}">
-                <a16:creationId xmlns:a16="http://schemas.microsoft.com/office/drawing/2014/main" id="{BB193E7C-B1E2-4ED2-80F4-B2EDCA42AC47}"/>
+          <p:cNvPr id="9" name="Picture 4">
+            <a:extLst>
+              <a:ext uri="{FF2B5EF4-FFF2-40B4-BE49-F238E27FC236}">
+                <a16:creationId xmlns:a16="http://schemas.microsoft.com/office/drawing/2014/main" id="{6DFFF814-6CBB-4758-88BD-E8BF3B1C38A3}"/>
               </a:ext>
             </a:extLst>
           </p:cNvPr>
@@ -9071,10 +8394,59 @@
       </p:pic>
       <p:sp>
         <p:nvSpPr>
+          <p:cNvPr id="10" name="TextBox 9">
+            <a:extLst>
+              <a:ext uri="{FF2B5EF4-FFF2-40B4-BE49-F238E27FC236}">
+                <a16:creationId xmlns:a16="http://schemas.microsoft.com/office/drawing/2014/main" id="{CC3227F4-0F38-48EC-8AD5-5B33741E3010}"/>
+              </a:ext>
+            </a:extLst>
+          </p:cNvPr>
+          <p:cNvSpPr txBox="1"/>
+          <p:nvPr/>
+        </p:nvSpPr>
+        <p:spPr>
+          <a:xfrm>
+            <a:off x="410333" y="1338570"/>
+            <a:ext cx="6477027" cy="369332"/>
+          </a:xfrm>
+          <a:prstGeom prst="rect">
+            <a:avLst/>
+          </a:prstGeom>
+          <a:solidFill>
+            <a:schemeClr val="accent6">
+              <a:lumMod val="20000"/>
+              <a:lumOff val="80000"/>
+            </a:schemeClr>
+          </a:solidFill>
+          <a:ln w="38100">
+            <a:solidFill>
+              <a:schemeClr val="bg1"/>
+            </a:solidFill>
+          </a:ln>
+        </p:spPr>
+        <p:txBody>
+          <a:bodyPr wrap="square" rtlCol="0">
+            <a:spAutoFit/>
+          </a:bodyPr>
+          <a:lstStyle>
+            <a:defPPr>
+              <a:defRPr lang="it-IT"/>
+            </a:defPPr>
+          </a:lstStyle>
+          <a:p>
+            <a:r>
+              <a:rPr lang="it-IT" dirty="0"/>
+              <a:t>Contiene l’intero dataset</a:t>
+            </a:r>
+          </a:p>
+        </p:txBody>
+      </p:sp>
+      <p:sp>
+        <p:nvSpPr>
           <p:cNvPr id="11" name="TextBox 10">
             <a:extLst>
               <a:ext uri="{FF2B5EF4-FFF2-40B4-BE49-F238E27FC236}">
-                <a16:creationId xmlns:a16="http://schemas.microsoft.com/office/drawing/2014/main" id="{E4BBF90F-DA08-41E4-A16E-1BFCF831EF39}"/>
+                <a16:creationId xmlns:a16="http://schemas.microsoft.com/office/drawing/2014/main" id="{F684AC4B-4E1E-45AE-A274-39CFB425202E}"/>
               </a:ext>
             </a:extLst>
           </p:cNvPr>
@@ -9083,8 +8455,155 @@
         </p:nvSpPr>
         <p:spPr>
           <a:xfrm>
+            <a:off x="410331" y="1707902"/>
+            <a:ext cx="6477027" cy="369332"/>
+          </a:xfrm>
+          <a:prstGeom prst="rect">
+            <a:avLst/>
+          </a:prstGeom>
+          <a:solidFill>
+            <a:schemeClr val="accent2">
+              <a:lumMod val="20000"/>
+              <a:lumOff val="80000"/>
+            </a:schemeClr>
+          </a:solidFill>
+          <a:ln w="38100">
+            <a:solidFill>
+              <a:schemeClr val="bg1"/>
+            </a:solidFill>
+          </a:ln>
+        </p:spPr>
+        <p:txBody>
+          <a:bodyPr wrap="square" rtlCol="0">
+            <a:spAutoFit/>
+          </a:bodyPr>
+          <a:lstStyle>
+            <a:defPPr>
+              <a:defRPr lang="it-IT"/>
+            </a:defPPr>
+          </a:lstStyle>
+          <a:p>
+            <a:r>
+              <a:rPr lang="it-IT" dirty="0"/>
+              <a:t>Foglie colorate per facilitare l’individuazione degli inquinanti</a:t>
+            </a:r>
+          </a:p>
+        </p:txBody>
+      </p:sp>
+      <p:sp>
+        <p:nvSpPr>
+          <p:cNvPr id="12" name="TextBox 11">
+            <a:extLst>
+              <a:ext uri="{FF2B5EF4-FFF2-40B4-BE49-F238E27FC236}">
+                <a16:creationId xmlns:a16="http://schemas.microsoft.com/office/drawing/2014/main" id="{9FB2D834-EC73-4124-90D6-3F3652694FB0}"/>
+              </a:ext>
+            </a:extLst>
+          </p:cNvPr>
+          <p:cNvSpPr txBox="1"/>
+          <p:nvPr/>
+        </p:nvSpPr>
+        <p:spPr>
+          <a:xfrm>
+            <a:off x="410329" y="2077234"/>
+            <a:ext cx="6477025" cy="369332"/>
+          </a:xfrm>
+          <a:prstGeom prst="rect">
+            <a:avLst/>
+          </a:prstGeom>
+          <a:solidFill>
+            <a:schemeClr val="accent5">
+              <a:lumMod val="20000"/>
+              <a:lumOff val="80000"/>
+            </a:schemeClr>
+          </a:solidFill>
+          <a:ln w="38100">
+            <a:solidFill>
+              <a:schemeClr val="bg1"/>
+            </a:solidFill>
+          </a:ln>
+        </p:spPr>
+        <p:txBody>
+          <a:bodyPr wrap="square" rtlCol="0">
+            <a:spAutoFit/>
+          </a:bodyPr>
+          <a:lstStyle>
+            <a:defPPr>
+              <a:defRPr lang="it-IT"/>
+            </a:defPPr>
+          </a:lstStyle>
+          <a:p>
+            <a:r>
+              <a:rPr lang="it-IT" dirty="0"/>
+              <a:t>Interazione: permette di esaminare qualunque punto del dataset</a:t>
+            </a:r>
+          </a:p>
+        </p:txBody>
+      </p:sp>
+      <p:sp>
+        <p:nvSpPr>
+          <p:cNvPr id="13" name="TextBox 12">
+            <a:extLst>
+              <a:ext uri="{FF2B5EF4-FFF2-40B4-BE49-F238E27FC236}">
+                <a16:creationId xmlns:a16="http://schemas.microsoft.com/office/drawing/2014/main" id="{1134B998-5544-4055-A17F-C87817F22F5B}"/>
+              </a:ext>
+            </a:extLst>
+          </p:cNvPr>
+          <p:cNvSpPr txBox="1"/>
+          <p:nvPr/>
+        </p:nvSpPr>
+        <p:spPr>
+          <a:xfrm>
+            <a:off x="410323" y="2446566"/>
+            <a:ext cx="6477025" cy="369332"/>
+          </a:xfrm>
+          <a:prstGeom prst="rect">
+            <a:avLst/>
+          </a:prstGeom>
+          <a:solidFill>
+            <a:schemeClr val="accent4">
+              <a:lumMod val="20000"/>
+              <a:lumOff val="80000"/>
+            </a:schemeClr>
+          </a:solidFill>
+          <a:ln w="38100">
+            <a:solidFill>
+              <a:schemeClr val="bg1"/>
+            </a:solidFill>
+          </a:ln>
+        </p:spPr>
+        <p:txBody>
+          <a:bodyPr wrap="square" rtlCol="0">
+            <a:spAutoFit/>
+          </a:bodyPr>
+          <a:lstStyle>
+            <a:defPPr>
+              <a:defRPr lang="it-IT"/>
+            </a:defPPr>
+          </a:lstStyle>
+          <a:p>
+            <a:r>
+              <a:rPr lang="it-IT" dirty="0"/>
+              <a:t>Scopo: esplorazione del dataset</a:t>
+            </a:r>
+          </a:p>
+        </p:txBody>
+      </p:sp>
+      <p:sp>
+        <p:nvSpPr>
+          <p:cNvPr id="15" name="TextBox 14">
+            <a:extLst>
+              <a:ext uri="{FF2B5EF4-FFF2-40B4-BE49-F238E27FC236}">
+                <a16:creationId xmlns:a16="http://schemas.microsoft.com/office/drawing/2014/main" id="{BEC5CCBE-059B-4E3C-B9E3-7DA343ED030C}"/>
+              </a:ext>
+            </a:extLst>
+          </p:cNvPr>
+          <p:cNvSpPr txBox="1"/>
+          <p:nvPr/>
+        </p:nvSpPr>
+        <p:spPr>
+          <a:xfrm>
             <a:off x="0" y="0"/>
-            <a:ext cx="12192000" cy="830997"/>
+            <a:ext cx="6887361" cy="830997"/>
           </a:xfrm>
           <a:prstGeom prst="rect">
             <a:avLst/>
@@ -9110,249 +8629,33 @@
           <a:p>
             <a:r>
               <a:rPr lang="it-IT" dirty="0"/>
-              <a:t>APPLICAZIONE: INQUINAMENTO</a:t>
-            </a:r>
-          </a:p>
-        </p:txBody>
-      </p:sp>
-      <p:sp>
-        <p:nvSpPr>
-          <p:cNvPr id="12" name="TextBox 11">
-            <a:extLst>
-              <a:ext uri="{FF2B5EF4-FFF2-40B4-BE49-F238E27FC236}">
-                <a16:creationId xmlns:a16="http://schemas.microsoft.com/office/drawing/2014/main" id="{937E82BD-5B88-4FE4-9396-1ED1CF7E22F4}"/>
-              </a:ext>
-            </a:extLst>
-          </p:cNvPr>
-          <p:cNvSpPr txBox="1"/>
-          <p:nvPr/>
-        </p:nvSpPr>
-        <p:spPr>
-          <a:xfrm>
-            <a:off x="427839" y="1338864"/>
-            <a:ext cx="6370039" cy="369332"/>
+              <a:t>ALBERO ESPLORABILE</a:t>
+            </a:r>
+          </a:p>
+        </p:txBody>
+      </p:sp>
+      <p:sp>
+        <p:nvSpPr>
+          <p:cNvPr id="17" name="Rectangle 16">
+            <a:extLst>
+              <a:ext uri="{FF2B5EF4-FFF2-40B4-BE49-F238E27FC236}">
+                <a16:creationId xmlns:a16="http://schemas.microsoft.com/office/drawing/2014/main" id="{6B3AF0A0-0EEE-4CC7-A0E7-9C3E5B287E84}"/>
+              </a:ext>
+            </a:extLst>
+          </p:cNvPr>
+          <p:cNvSpPr/>
+          <p:nvPr/>
+        </p:nvSpPr>
+        <p:spPr>
+          <a:xfrm>
+            <a:off x="6887360" y="0"/>
+            <a:ext cx="5304639" cy="6858000"/>
           </a:xfrm>
           <a:prstGeom prst="rect">
             <a:avLst/>
           </a:prstGeom>
           <a:solidFill>
-            <a:schemeClr val="accent6">
-              <a:lumMod val="20000"/>
-              <a:lumOff val="80000"/>
-            </a:schemeClr>
-          </a:solidFill>
-          <a:ln w="38100">
-            <a:solidFill>
-              <a:schemeClr val="bg1"/>
-            </a:solidFill>
-          </a:ln>
-        </p:spPr>
-        <p:txBody>
-          <a:bodyPr wrap="square" rtlCol="0">
-            <a:spAutoFit/>
-          </a:bodyPr>
-          <a:lstStyle>
-            <a:defPPr>
-              <a:defRPr lang="it-IT"/>
-            </a:defPPr>
-          </a:lstStyle>
-          <a:p>
-            <a:r>
-              <a:rPr lang="it-IT" dirty="0"/>
-              <a:t>La gerarchia è il tempo (date delle rilevazioni)</a:t>
-            </a:r>
-          </a:p>
-        </p:txBody>
-      </p:sp>
-      <p:sp>
-        <p:nvSpPr>
-          <p:cNvPr id="13" name="TextBox 12">
-            <a:extLst>
-              <a:ext uri="{FF2B5EF4-FFF2-40B4-BE49-F238E27FC236}">
-                <a16:creationId xmlns:a16="http://schemas.microsoft.com/office/drawing/2014/main" id="{9FB0B5FA-E611-4134-B141-9261571004AA}"/>
-              </a:ext>
-            </a:extLst>
-          </p:cNvPr>
-          <p:cNvSpPr txBox="1"/>
-          <p:nvPr/>
-        </p:nvSpPr>
-        <p:spPr>
-          <a:xfrm>
-            <a:off x="427839" y="1708196"/>
-            <a:ext cx="6370039" cy="369332"/>
-          </a:xfrm>
-          <a:prstGeom prst="rect">
-            <a:avLst/>
-          </a:prstGeom>
-          <a:solidFill>
-            <a:schemeClr val="accent5">
-              <a:lumMod val="20000"/>
-              <a:lumOff val="80000"/>
-            </a:schemeClr>
-          </a:solidFill>
-          <a:ln w="38100">
-            <a:solidFill>
-              <a:schemeClr val="bg1"/>
-            </a:solidFill>
-          </a:ln>
-        </p:spPr>
-        <p:txBody>
-          <a:bodyPr wrap="square" rtlCol="0">
-            <a:spAutoFit/>
-          </a:bodyPr>
-          <a:lstStyle>
-            <a:defPPr>
-              <a:defRPr lang="it-IT"/>
-            </a:defPPr>
-          </a:lstStyle>
-          <a:p>
-            <a:r>
-              <a:rPr lang="it-IT" dirty="0"/>
-              <a:t>Dataset originale lineare (formato CSV)</a:t>
-            </a:r>
-          </a:p>
-        </p:txBody>
-      </p:sp>
-      <p:sp>
-        <p:nvSpPr>
-          <p:cNvPr id="14" name="TextBox 13">
-            <a:extLst>
-              <a:ext uri="{FF2B5EF4-FFF2-40B4-BE49-F238E27FC236}">
-                <a16:creationId xmlns:a16="http://schemas.microsoft.com/office/drawing/2014/main" id="{137C1E9D-C71A-49E7-AB97-D68D9AB0E095}"/>
-              </a:ext>
-            </a:extLst>
-          </p:cNvPr>
-          <p:cNvSpPr txBox="1"/>
-          <p:nvPr/>
-        </p:nvSpPr>
-        <p:spPr>
-          <a:xfrm>
-            <a:off x="427838" y="2077528"/>
-            <a:ext cx="6370039" cy="923330"/>
-          </a:xfrm>
-          <a:prstGeom prst="rect">
-            <a:avLst/>
-          </a:prstGeom>
-          <a:solidFill>
-            <a:schemeClr val="accent4">
-              <a:lumMod val="20000"/>
-              <a:lumOff val="80000"/>
-            </a:schemeClr>
-          </a:solidFill>
-          <a:ln w="38100">
-            <a:solidFill>
-              <a:schemeClr val="bg1"/>
-            </a:solidFill>
-          </a:ln>
-        </p:spPr>
-        <p:txBody>
-          <a:bodyPr wrap="square" rtlCol="0">
-            <a:spAutoFit/>
-          </a:bodyPr>
-          <a:lstStyle>
-            <a:defPPr>
-              <a:defRPr lang="it-IT"/>
-            </a:defPPr>
-          </a:lstStyle>
-          <a:p>
-            <a:r>
-              <a:rPr lang="it-IT" dirty="0"/>
-              <a:t>Principale problematica: gerarchizzazione del dataset</a:t>
-            </a:r>
-          </a:p>
-          <a:p>
-            <a:pPr marL="285750" indent="-285750">
-              <a:buFont typeface="Arial" panose="020B0604020202020204" pitchFamily="34" charset="0"/>
-              <a:buChar char="•"/>
-            </a:pPr>
-            <a:r>
-              <a:rPr lang="it-IT" dirty="0"/>
-              <a:t>Uso di script in Java per effettuare parsing di date e osservazioni e generare la gerarchia in JSON</a:t>
-            </a:r>
-          </a:p>
-        </p:txBody>
-      </p:sp>
-      <p:sp>
-        <p:nvSpPr>
-          <p:cNvPr id="17" name="TextBox 16">
-            <a:extLst>
-              <a:ext uri="{FF2B5EF4-FFF2-40B4-BE49-F238E27FC236}">
-                <a16:creationId xmlns:a16="http://schemas.microsoft.com/office/drawing/2014/main" id="{E4B1E6F7-B8F5-476F-8666-3C3181658F50}"/>
-              </a:ext>
-            </a:extLst>
-          </p:cNvPr>
-          <p:cNvSpPr txBox="1"/>
-          <p:nvPr/>
-        </p:nvSpPr>
-        <p:spPr>
-          <a:xfrm>
-            <a:off x="427838" y="3000858"/>
-            <a:ext cx="6370039" cy="923330"/>
-          </a:xfrm>
-          <a:prstGeom prst="rect">
-            <a:avLst/>
-          </a:prstGeom>
-          <a:solidFill>
-            <a:schemeClr val="accent2">
-              <a:lumMod val="20000"/>
-              <a:lumOff val="80000"/>
-            </a:schemeClr>
-          </a:solidFill>
-          <a:ln w="38100">
-            <a:solidFill>
-              <a:schemeClr val="bg1"/>
-            </a:solidFill>
-          </a:ln>
-        </p:spPr>
-        <p:txBody>
-          <a:bodyPr wrap="square" rtlCol="0">
-            <a:spAutoFit/>
-          </a:bodyPr>
-          <a:lstStyle>
-            <a:defPPr>
-              <a:defRPr lang="it-IT"/>
-            </a:defPPr>
-          </a:lstStyle>
-          <a:p>
-            <a:r>
-              <a:rPr lang="it-IT" dirty="0"/>
-              <a:t>Necessità di generare gerarchie diverse a seconda della visualizzazione utilizzata</a:t>
-            </a:r>
-          </a:p>
-          <a:p>
-            <a:pPr marL="285750" indent="-285750">
-              <a:buFont typeface="Arial" panose="020B0604020202020204" pitchFamily="34" charset="0"/>
-              <a:buChar char="•"/>
-            </a:pPr>
-            <a:r>
-              <a:rPr lang="it-IT" dirty="0"/>
-              <a:t>esempio: le treemap non supportano i dati qualitativi</a:t>
-            </a:r>
-          </a:p>
-        </p:txBody>
-      </p:sp>
-      <p:sp>
-        <p:nvSpPr>
-          <p:cNvPr id="19" name="Rectangle 18">
-            <a:extLst>
-              <a:ext uri="{FF2B5EF4-FFF2-40B4-BE49-F238E27FC236}">
-                <a16:creationId xmlns:a16="http://schemas.microsoft.com/office/drawing/2014/main" id="{98B593E9-50C1-45DB-B7BA-E06DD929F20B}"/>
-              </a:ext>
-            </a:extLst>
-          </p:cNvPr>
-          <p:cNvSpPr/>
-          <p:nvPr/>
-        </p:nvSpPr>
-        <p:spPr>
-          <a:xfrm>
-            <a:off x="6797878" y="830996"/>
-            <a:ext cx="5394122" cy="6027003"/>
-          </a:xfrm>
-          <a:prstGeom prst="rect">
-            <a:avLst/>
-          </a:prstGeom>
-          <a:solidFill>
-            <a:schemeClr val="tx2">
+            <a:schemeClr val="accent3">
               <a:lumMod val="20000"/>
               <a:lumOff val="80000"/>
             </a:schemeClr>
@@ -9390,10 +8693,10 @@
       </p:sp>
       <p:pic>
         <p:nvPicPr>
-          <p:cNvPr id="4" name="Picture 3">
-            <a:extLst>
-              <a:ext uri="{FF2B5EF4-FFF2-40B4-BE49-F238E27FC236}">
-                <a16:creationId xmlns:a16="http://schemas.microsoft.com/office/drawing/2014/main" id="{40C79E73-7101-400C-BB6C-BDAA0CD26887}"/>
+          <p:cNvPr id="3" name="Picture 2">
+            <a:extLst>
+              <a:ext uri="{FF2B5EF4-FFF2-40B4-BE49-F238E27FC236}">
+                <a16:creationId xmlns:a16="http://schemas.microsoft.com/office/drawing/2014/main" id="{BDED0F34-72AA-408E-AFF1-6EE3BB6566E5}"/>
               </a:ext>
             </a:extLst>
           </p:cNvPr>
@@ -9410,38 +8713,8 @@
         </p:blipFill>
         <p:spPr>
           <a:xfrm>
-            <a:off x="7147733" y="986825"/>
-            <a:ext cx="4694412" cy="2773970"/>
-          </a:xfrm>
-          <a:prstGeom prst="rect">
-            <a:avLst/>
-          </a:prstGeom>
-        </p:spPr>
-      </p:pic>
-      <p:pic>
-        <p:nvPicPr>
-          <p:cNvPr id="3" name="Picture 2">
-            <a:extLst>
-              <a:ext uri="{FF2B5EF4-FFF2-40B4-BE49-F238E27FC236}">
-                <a16:creationId xmlns:a16="http://schemas.microsoft.com/office/drawing/2014/main" id="{9993B78F-3F8F-4643-9FCC-76FE6D9A5E10}"/>
-              </a:ext>
-            </a:extLst>
-          </p:cNvPr>
-          <p:cNvPicPr>
-            <a:picLocks noChangeAspect="1"/>
-          </p:cNvPicPr>
-          <p:nvPr/>
-        </p:nvPicPr>
-        <p:blipFill>
-          <a:blip r:embed="rId5"/>
-          <a:stretch>
-            <a:fillRect/>
-          </a:stretch>
-        </p:blipFill>
-        <p:spPr>
-          <a:xfrm>
-            <a:off x="7147733" y="3924188"/>
-            <a:ext cx="4694412" cy="2770417"/>
+            <a:off x="7036600" y="1189048"/>
+            <a:ext cx="5006157" cy="4479903"/>
           </a:xfrm>
           <a:prstGeom prst="rect">
             <a:avLst/>
@@ -9450,10 +8723,10 @@
       </p:pic>
       <p:cxnSp>
         <p:nvCxnSpPr>
-          <p:cNvPr id="22" name="Straight Connector 21">
-            <a:extLst>
-              <a:ext uri="{FF2B5EF4-FFF2-40B4-BE49-F238E27FC236}">
-                <a16:creationId xmlns:a16="http://schemas.microsoft.com/office/drawing/2014/main" id="{55034513-FB26-4C24-93CD-26CEA100770E}"/>
+          <p:cNvPr id="18" name="Straight Connector 17">
+            <a:extLst>
+              <a:ext uri="{FF2B5EF4-FFF2-40B4-BE49-F238E27FC236}">
+                <a16:creationId xmlns:a16="http://schemas.microsoft.com/office/drawing/2014/main" id="{2792D1B7-317F-40E8-A6D7-E96FDA55B498}"/>
               </a:ext>
             </a:extLst>
           </p:cNvPr>
@@ -9464,8 +8737,8 @@
         </p:nvCxnSpPr>
         <p:spPr>
           <a:xfrm>
-            <a:off x="1580099" y="789052"/>
-            <a:ext cx="9023755" cy="0"/>
+            <a:off x="847288" y="789052"/>
+            <a:ext cx="6040060" cy="0"/>
           </a:xfrm>
           <a:prstGeom prst="line">
             <a:avLst/>
@@ -9493,10 +8766,55 @@
           </a:fontRef>
         </p:style>
       </p:cxnSp>
+      <p:sp>
+        <p:nvSpPr>
+          <p:cNvPr id="5" name="Action Button: Return 4">
+            <a:hlinkClick r:id="rId5" highlightClick="1"/>
+            <a:extLst>
+              <a:ext uri="{FF2B5EF4-FFF2-40B4-BE49-F238E27FC236}">
+                <a16:creationId xmlns:a16="http://schemas.microsoft.com/office/drawing/2014/main" id="{0371A25A-8B2E-4D6E-83DE-21A091903F5F}"/>
+              </a:ext>
+            </a:extLst>
+          </p:cNvPr>
+          <p:cNvSpPr/>
+          <p:nvPr/>
+        </p:nvSpPr>
+        <p:spPr>
+          <a:xfrm rot="5400000">
+            <a:off x="11822667" y="6488667"/>
+            <a:ext cx="369332" cy="369332"/>
+          </a:xfrm>
+          <a:prstGeom prst="actionButtonReturn">
+            <a:avLst/>
+          </a:prstGeom>
+        </p:spPr>
+        <p:style>
+          <a:lnRef idx="1">
+            <a:schemeClr val="accent2"/>
+          </a:lnRef>
+          <a:fillRef idx="2">
+            <a:schemeClr val="accent2"/>
+          </a:fillRef>
+          <a:effectRef idx="1">
+            <a:schemeClr val="accent2"/>
+          </a:effectRef>
+          <a:fontRef idx="minor">
+            <a:schemeClr val="dk1"/>
+          </a:fontRef>
+        </p:style>
+        <p:txBody>
+          <a:bodyPr rtlCol="0" anchor="ctr"/>
+          <a:lstStyle/>
+          <a:p>
+            <a:pPr algn="ctr"/>
+            <a:endParaRPr lang="it-IT"/>
+          </a:p>
+        </p:txBody>
+      </p:sp>
     </p:spTree>
     <p:extLst>
       <p:ext uri="{BB962C8B-B14F-4D97-AF65-F5344CB8AC3E}">
-        <p14:creationId xmlns:p14="http://schemas.microsoft.com/office/powerpoint/2010/main" val="3264423421"/>
+        <p14:creationId xmlns:p14="http://schemas.microsoft.com/office/powerpoint/2010/main" val="2413595051"/>
       </p:ext>
     </p:extLst>
   </p:cSld>

</xml_diff>

<commit_message>
Lorenzo: ultimi aggiornamenti powerpoint
</commit_message>
<xml_diff>
--- a/PowerPoint/Treemaps.pptx
+++ b/PowerPoint/Treemaps.pptx
@@ -273,7 +273,7 @@
           <a:p>
             <a:fld id="{A1720CB6-C394-4595-9B0B-B51B5CA3DAC2}" type="datetimeFigureOut">
               <a:rPr lang="it-IT" smtClean="0"/>
-              <a:t>15/05/2020</a:t>
+              <a:t>17/05/2020</a:t>
             </a:fld>
             <a:endParaRPr lang="it-IT"/>
           </a:p>
@@ -473,7 +473,7 @@
           <a:p>
             <a:fld id="{A1720CB6-C394-4595-9B0B-B51B5CA3DAC2}" type="datetimeFigureOut">
               <a:rPr lang="it-IT" smtClean="0"/>
-              <a:t>15/05/2020</a:t>
+              <a:t>17/05/2020</a:t>
             </a:fld>
             <a:endParaRPr lang="it-IT"/>
           </a:p>
@@ -683,7 +683,7 @@
           <a:p>
             <a:fld id="{A1720CB6-C394-4595-9B0B-B51B5CA3DAC2}" type="datetimeFigureOut">
               <a:rPr lang="it-IT" smtClean="0"/>
-              <a:t>15/05/2020</a:t>
+              <a:t>17/05/2020</a:t>
             </a:fld>
             <a:endParaRPr lang="it-IT"/>
           </a:p>
@@ -883,7 +883,7 @@
           <a:p>
             <a:fld id="{A1720CB6-C394-4595-9B0B-B51B5CA3DAC2}" type="datetimeFigureOut">
               <a:rPr lang="it-IT" smtClean="0"/>
-              <a:t>15/05/2020</a:t>
+              <a:t>17/05/2020</a:t>
             </a:fld>
             <a:endParaRPr lang="it-IT"/>
           </a:p>
@@ -1159,7 +1159,7 @@
           <a:p>
             <a:fld id="{A1720CB6-C394-4595-9B0B-B51B5CA3DAC2}" type="datetimeFigureOut">
               <a:rPr lang="it-IT" smtClean="0"/>
-              <a:t>15/05/2020</a:t>
+              <a:t>17/05/2020</a:t>
             </a:fld>
             <a:endParaRPr lang="it-IT"/>
           </a:p>
@@ -1427,7 +1427,7 @@
           <a:p>
             <a:fld id="{A1720CB6-C394-4595-9B0B-B51B5CA3DAC2}" type="datetimeFigureOut">
               <a:rPr lang="it-IT" smtClean="0"/>
-              <a:t>15/05/2020</a:t>
+              <a:t>17/05/2020</a:t>
             </a:fld>
             <a:endParaRPr lang="it-IT"/>
           </a:p>
@@ -1842,7 +1842,7 @@
           <a:p>
             <a:fld id="{A1720CB6-C394-4595-9B0B-B51B5CA3DAC2}" type="datetimeFigureOut">
               <a:rPr lang="it-IT" smtClean="0"/>
-              <a:t>15/05/2020</a:t>
+              <a:t>17/05/2020</a:t>
             </a:fld>
             <a:endParaRPr lang="it-IT"/>
           </a:p>
@@ -1984,7 +1984,7 @@
           <a:p>
             <a:fld id="{A1720CB6-C394-4595-9B0B-B51B5CA3DAC2}" type="datetimeFigureOut">
               <a:rPr lang="it-IT" smtClean="0"/>
-              <a:t>15/05/2020</a:t>
+              <a:t>17/05/2020</a:t>
             </a:fld>
             <a:endParaRPr lang="it-IT"/>
           </a:p>
@@ -2097,7 +2097,7 @@
           <a:p>
             <a:fld id="{A1720CB6-C394-4595-9B0B-B51B5CA3DAC2}" type="datetimeFigureOut">
               <a:rPr lang="it-IT" smtClean="0"/>
-              <a:t>15/05/2020</a:t>
+              <a:t>17/05/2020</a:t>
             </a:fld>
             <a:endParaRPr lang="it-IT"/>
           </a:p>
@@ -2410,7 +2410,7 @@
           <a:p>
             <a:fld id="{A1720CB6-C394-4595-9B0B-B51B5CA3DAC2}" type="datetimeFigureOut">
               <a:rPr lang="it-IT" smtClean="0"/>
-              <a:t>15/05/2020</a:t>
+              <a:t>17/05/2020</a:t>
             </a:fld>
             <a:endParaRPr lang="it-IT"/>
           </a:p>
@@ -2699,7 +2699,7 @@
           <a:p>
             <a:fld id="{A1720CB6-C394-4595-9B0B-B51B5CA3DAC2}" type="datetimeFigureOut">
               <a:rPr lang="it-IT" smtClean="0"/>
-              <a:t>15/05/2020</a:t>
+              <a:t>17/05/2020</a:t>
             </a:fld>
             <a:endParaRPr lang="it-IT"/>
           </a:p>
@@ -2942,7 +2942,7 @@
           <a:p>
             <a:fld id="{A1720CB6-C394-4595-9B0B-B51B5CA3DAC2}" type="datetimeFigureOut">
               <a:rPr lang="it-IT" smtClean="0"/>
-              <a:t>15/05/2020</a:t>
+              <a:t>17/05/2020</a:t>
             </a:fld>
             <a:endParaRPr lang="it-IT"/>
           </a:p>
@@ -5046,66 +5046,6 @@
           </a:p>
         </p:txBody>
       </p:sp>
-      <p:pic>
-        <p:nvPicPr>
-          <p:cNvPr id="2" name="Picture 1">
-            <a:extLst>
-              <a:ext uri="{FF2B5EF4-FFF2-40B4-BE49-F238E27FC236}">
-                <a16:creationId xmlns:a16="http://schemas.microsoft.com/office/drawing/2014/main" id="{480729BF-E37D-4EE8-BB3F-495DE9A36872}"/>
-              </a:ext>
-            </a:extLst>
-          </p:cNvPr>
-          <p:cNvPicPr>
-            <a:picLocks noChangeAspect="1"/>
-          </p:cNvPicPr>
-          <p:nvPr/>
-        </p:nvPicPr>
-        <p:blipFill>
-          <a:blip r:embed="rId4"/>
-          <a:stretch>
-            <a:fillRect/>
-          </a:stretch>
-        </p:blipFill>
-        <p:spPr>
-          <a:xfrm>
-            <a:off x="6129556" y="2926887"/>
-            <a:ext cx="4783223" cy="3728906"/>
-          </a:xfrm>
-          <a:prstGeom prst="rect">
-            <a:avLst/>
-          </a:prstGeom>
-        </p:spPr>
-      </p:pic>
-      <p:pic>
-        <p:nvPicPr>
-          <p:cNvPr id="4" name="Picture 3">
-            <a:extLst>
-              <a:ext uri="{FF2B5EF4-FFF2-40B4-BE49-F238E27FC236}">
-                <a16:creationId xmlns:a16="http://schemas.microsoft.com/office/drawing/2014/main" id="{F18E2021-5705-489C-B8B2-12D9AF3C54A7}"/>
-              </a:ext>
-            </a:extLst>
-          </p:cNvPr>
-          <p:cNvPicPr>
-            <a:picLocks noChangeAspect="1"/>
-          </p:cNvPicPr>
-          <p:nvPr/>
-        </p:nvPicPr>
-        <p:blipFill>
-          <a:blip r:embed="rId5"/>
-          <a:stretch>
-            <a:fillRect/>
-          </a:stretch>
-        </p:blipFill>
-        <p:spPr>
-          <a:xfrm>
-            <a:off x="1271296" y="2926887"/>
-            <a:ext cx="4799537" cy="3728906"/>
-          </a:xfrm>
-          <a:prstGeom prst="rect">
-            <a:avLst/>
-          </a:prstGeom>
-        </p:spPr>
-      </p:pic>
       <p:sp>
         <p:nvSpPr>
           <p:cNvPr id="7" name="TextBox 6">
@@ -5203,7 +5143,7 @@
       <p:sp>
         <p:nvSpPr>
           <p:cNvPr id="22" name="Action Button: Return 21">
-            <a:hlinkClick r:id="rId6" highlightClick="1"/>
+            <a:hlinkClick r:id="rId4" highlightClick="1"/>
             <a:extLst>
               <a:ext uri="{FF2B5EF4-FFF2-40B4-BE49-F238E27FC236}">
                 <a16:creationId xmlns:a16="http://schemas.microsoft.com/office/drawing/2014/main" id="{C408AFD2-D4FF-46EA-9B3B-3BAAAC7C7DFC}"/>
@@ -5248,7 +5188,7 @@
       <p:sp>
         <p:nvSpPr>
           <p:cNvPr id="23" name="Action Button: Return 22">
-            <a:hlinkClick r:id="rId7" highlightClick="1"/>
+            <a:hlinkClick r:id="rId5" highlightClick="1"/>
             <a:extLst>
               <a:ext uri="{FF2B5EF4-FFF2-40B4-BE49-F238E27FC236}">
                 <a16:creationId xmlns:a16="http://schemas.microsoft.com/office/drawing/2014/main" id="{78AA24FB-41CD-4745-9872-BC5E9402CF12}"/>
@@ -5290,6 +5230,65 @@
           </a:p>
         </p:txBody>
       </p:sp>
+      <p:pic>
+        <p:nvPicPr>
+          <p:cNvPr id="3" name="Picture 2">
+            <a:extLst>
+              <a:ext uri="{FF2B5EF4-FFF2-40B4-BE49-F238E27FC236}">
+                <a16:creationId xmlns:a16="http://schemas.microsoft.com/office/drawing/2014/main" id="{8A7A7212-3BDF-4FD6-AD64-3AD794CF7BE0}"/>
+              </a:ext>
+            </a:extLst>
+          </p:cNvPr>
+          <p:cNvPicPr>
+            <a:picLocks noChangeAspect="1"/>
+          </p:cNvPicPr>
+          <p:nvPr/>
+        </p:nvPicPr>
+        <p:blipFill rotWithShape="1">
+          <a:blip r:embed="rId6"/>
+          <a:srcRect r="330"/>
+          <a:stretch/>
+        </p:blipFill>
+        <p:spPr>
+          <a:xfrm>
+            <a:off x="6127851" y="2926887"/>
+            <a:ext cx="4784927" cy="3728906"/>
+          </a:xfrm>
+          <a:prstGeom prst="rect">
+            <a:avLst/>
+          </a:prstGeom>
+        </p:spPr>
+      </p:pic>
+      <p:pic>
+        <p:nvPicPr>
+          <p:cNvPr id="5" name="Picture 4">
+            <a:extLst>
+              <a:ext uri="{FF2B5EF4-FFF2-40B4-BE49-F238E27FC236}">
+                <a16:creationId xmlns:a16="http://schemas.microsoft.com/office/drawing/2014/main" id="{D186A505-998F-4760-AE47-AA8D537BF8B3}"/>
+              </a:ext>
+            </a:extLst>
+          </p:cNvPr>
+          <p:cNvPicPr>
+            <a:picLocks noChangeAspect="1"/>
+          </p:cNvPicPr>
+          <p:nvPr/>
+        </p:nvPicPr>
+        <p:blipFill>
+          <a:blip r:embed="rId7"/>
+          <a:stretch>
+            <a:fillRect/>
+          </a:stretch>
+        </p:blipFill>
+        <p:spPr>
+          <a:xfrm>
+            <a:off x="1301823" y="2931182"/>
+            <a:ext cx="4778250" cy="3720316"/>
+          </a:xfrm>
+          <a:prstGeom prst="rect">
+            <a:avLst/>
+          </a:prstGeom>
+        </p:spPr>
+      </p:pic>
     </p:spTree>
     <p:extLst>
       <p:ext uri="{BB962C8B-B14F-4D97-AF65-F5344CB8AC3E}">
@@ -8691,36 +8690,6 @@
           </a:p>
         </p:txBody>
       </p:sp>
-      <p:pic>
-        <p:nvPicPr>
-          <p:cNvPr id="3" name="Picture 2">
-            <a:extLst>
-              <a:ext uri="{FF2B5EF4-FFF2-40B4-BE49-F238E27FC236}">
-                <a16:creationId xmlns:a16="http://schemas.microsoft.com/office/drawing/2014/main" id="{BDED0F34-72AA-408E-AFF1-6EE3BB6566E5}"/>
-              </a:ext>
-            </a:extLst>
-          </p:cNvPr>
-          <p:cNvPicPr>
-            <a:picLocks noChangeAspect="1"/>
-          </p:cNvPicPr>
-          <p:nvPr/>
-        </p:nvPicPr>
-        <p:blipFill>
-          <a:blip r:embed="rId4"/>
-          <a:stretch>
-            <a:fillRect/>
-          </a:stretch>
-        </p:blipFill>
-        <p:spPr>
-          <a:xfrm>
-            <a:off x="7036600" y="1189048"/>
-            <a:ext cx="5006157" cy="4479903"/>
-          </a:xfrm>
-          <a:prstGeom prst="rect">
-            <a:avLst/>
-          </a:prstGeom>
-        </p:spPr>
-      </p:pic>
       <p:cxnSp>
         <p:nvCxnSpPr>
           <p:cNvPr id="18" name="Straight Connector 17">
@@ -8769,7 +8738,7 @@
       <p:sp>
         <p:nvSpPr>
           <p:cNvPr id="5" name="Action Button: Return 4">
-            <a:hlinkClick r:id="rId5" highlightClick="1"/>
+            <a:hlinkClick r:id="rId4" highlightClick="1"/>
             <a:extLst>
               <a:ext uri="{FF2B5EF4-FFF2-40B4-BE49-F238E27FC236}">
                 <a16:creationId xmlns:a16="http://schemas.microsoft.com/office/drawing/2014/main" id="{0371A25A-8B2E-4D6E-83DE-21A091903F5F}"/>
@@ -8811,6 +8780,36 @@
           </a:p>
         </p:txBody>
       </p:sp>
+      <p:pic>
+        <p:nvPicPr>
+          <p:cNvPr id="2" name="Picture 1">
+            <a:extLst>
+              <a:ext uri="{FF2B5EF4-FFF2-40B4-BE49-F238E27FC236}">
+                <a16:creationId xmlns:a16="http://schemas.microsoft.com/office/drawing/2014/main" id="{FC920148-C63C-4C18-9477-C794AAA32C32}"/>
+              </a:ext>
+            </a:extLst>
+          </p:cNvPr>
+          <p:cNvPicPr>
+            <a:picLocks noChangeAspect="1"/>
+          </p:cNvPicPr>
+          <p:nvPr/>
+        </p:nvPicPr>
+        <p:blipFill>
+          <a:blip r:embed="rId5"/>
+          <a:stretch>
+            <a:fillRect/>
+          </a:stretch>
+        </p:blipFill>
+        <p:spPr>
+          <a:xfrm>
+            <a:off x="7038335" y="1338570"/>
+            <a:ext cx="5002687" cy="4188296"/>
+          </a:xfrm>
+          <a:prstGeom prst="rect">
+            <a:avLst/>
+          </a:prstGeom>
+        </p:spPr>
+      </p:pic>
     </p:spTree>
     <p:extLst>
       <p:ext uri="{BB962C8B-B14F-4D97-AF65-F5344CB8AC3E}">

</xml_diff>